<commit_message>
add sản phẩm vào giỏ hàng
</commit_message>
<xml_diff>
--- a/lesson9.pptx
+++ b/lesson9.pptx
@@ -586,6 +586,228 @@
   <inkml:trace contextRef="#ctx0" brushRef="#br0" timeOffset="121733">20465 7112 10051,'-18'-1'-675,"6"13"1,7-8-1,5 9 1</inkml:trace>
   <inkml:trace contextRef="#ctx0" brushRef="#br0" timeOffset="122264">20748 7312 9152,'0'7'989,"0"1"-899,0-1 0,0 2-90,0 0 90,0 2-180,0 2 90,16 2 90,-12 9-180,11-6 0,-2 15 90,-10-14 0,20 5-270,-20-9-89,14-3-1,-16-2 0,12-2 90,-9-4 90,6-1 180,-5-23 0,1-5 0,0-13 90,3-9 0,-2 17 180,6-15-90,-4 29 719,7-12-719,-6 26 90,14-8-180,-10 25-90,14 6 0,-14-1 0,7 27 0,-9-40 0,2 41-90,-5-43 90,-1 24-90,-1-26-180,3 15 180,-1-16 90,9 5 90,-6-21-90,7-7 0,-6 2 90,1-20 0,-6 23 0,-1-18-90,-1 20 180,0-10-90,-1 11 450,-2-3-630,0 6 180,3 10-90,-3 15-90,5-11-720,4 27-359,0-10-1440,17 18 2609,-8-17 0,13 11 0,-7-16 0</inkml:trace>
   <inkml:trace contextRef="#ctx0" brushRef="#br0" timeOffset="122666">21790 7319 10501,'-39'-13'1259,"-1"2"-1169,2 11-180,3 19 90,7 3 90,12 19-180,9-10-90,7 6-359,19-17 179,5 8 180,22-15 360,-2-2-180,-1-7 180,-20-22 180,0 14 179,-21-30-179,5 10 90,-7-8 90,0 1-540,0 4-90,-20 14 180,15-10-90,-26 21 0,28 11 0,-8 16 0,11 11 0,19 19 0,-15-19 0,13-5 0,-2 0-180,-11 6-360,9 19 270,-13-24-1079,-24 16 629,1-21-269,-25 3-495,13-18 0,-1-3 1484,-22 0 0,16-4 0,0-1 0,-18-3 0</inkml:trace>
+</inkml:ink>
+</file>
+
+<file path=ppt/ink/ink11.xml><?xml version="1.0" encoding="utf-8"?>
+<inkml:ink xmlns:inkml="http://www.w3.org/2003/InkML">
+  <inkml:definitions>
+    <inkml:context xml:id="ctx0">
+      <inkml:inkSource xml:id="inkSrc0">
+        <inkml:traceFormat>
+          <inkml:channel name="X" type="integer" min="-2.14748E9" max="2.14748E9" units="cm"/>
+          <inkml:channel name="Y" type="integer" min="-2.14748E9" max="2.14748E9" units="cm"/>
+          <inkml:channel name="F" type="integer" max="32767" units="dev"/>
+        </inkml:traceFormat>
+        <inkml:channelProperties>
+          <inkml:channelProperty channel="X" name="resolution" value="1000" units="1/cm"/>
+          <inkml:channelProperty channel="Y" name="resolution" value="1000" units="1/cm"/>
+          <inkml:channelProperty channel="F" name="resolution" value="0" units="1/dev"/>
+        </inkml:channelProperties>
+      </inkml:inkSource>
+      <inkml:timestamp xml:id="ts0" timeString="2021-07-26T05:58:47.342"/>
+    </inkml:context>
+    <inkml:brush xml:id="br0">
+      <inkml:brushProperty name="width" value="0.09071" units="cm"/>
+      <inkml:brushProperty name="height" value="0.09071" units="cm"/>
+      <inkml:brushProperty name="color" value="#FF0000"/>
+    </inkml:brush>
+  </inkml:definitions>
+  <inkml:trace contextRef="#ctx0" brushRef="#br0">2018 1904 8252,'17'-20'1260,"-13"-8"-991,27 6-179,-27-7 270,24-7-90,-24 4-180,15 4 0,3 0-90,-4-19-254,1 16 0,2-2 344,-3-5 0,-2 1-90,11-23 0,-6 6 0,0-1-212,-9 21 0,-1 0 212,6-25 0,-3 0-45,-6 25 0,-1-2 45,-2-7 0,-1-5 0,-1 5 90,2-20-135,-2 9 0,-5 3-135,-17 13 0,15-9 180,-31 27-360,20 2 270,-17 14 325,5 1-325,3 26 0,-2 11 90,10 14 0,-2 8-45,12-17 0,2 1 45,1-6 0,0 2 0,1 6 0,0 5 0,1-3-106,0-1 1,2 0 105,4 6 0,1 5 0,2-4-1251,2-4 0,0-2 1161,1 13 0,0 2-45,5-5 0,0-2-39,-4-14 1,1 1-232,8 20 1,2-2 134,-5-26 0,1-1-360,6 14 1,0-1 629,6-2 0,11 7 0,-12-22 0</inkml:trace>
+  <inkml:trace contextRef="#ctx0" brushRef="#br0" timeOffset="742">2785 1635 8252,'0'-8'-180,"0"2"180,0 3 360,-10 1-360,7 19 0,-7 8 0,30 12 0,-15 2 0,29-4 0,-31 0 0,28 2-180,-9 10 0,8-12-359,9 15 269,-16-29 90,6 4 0,-8-19-90,0-2 180,-2-4 90,9-24 90,-9 18 180,-3-23 0,-3-6 180,-1 8-226,-5-10 1,-2-3 225,-3 2-180,-1-8 270,-1 10-720,-17 13 360,13-5-90,-12 42-90,16 8 0,22 35 0,2-10-135,-1-16 0,2-2-225,10 6 90,-12-10 0,1-2 90,6-2 0,9 2-179,4-17 269,-13-2 180,20-28-90,-26 18 269,-5-23 1,-4-4 180,-3 9 0,-1-32 90,-9 24-181,-1 3 91,-1 3-180,0-3-540,-17 10 450,13 19-540,4 12-359,18 23 539,20-3 180,-8-12-90,2 2 0,-6-20 90,0 6 0,2-8 90,8 0-90,-10-15 270,8-4 179,-20 0 631,-2-16-720,-10 15-630,-2-14 180,-14 15-1349,26 28 539,-8 15-1259,33 22 2159,-7-14 0,3-1 0,-6-11 0</inkml:trace>
+  <inkml:trace contextRef="#ctx0" brushRef="#br0" timeOffset="966">3160 1240 7713,'-3'-7'0,"1"0"90,2 2-1,23 3-808,-3 15-540,6 18 1259,-12 11 0,-14 16 0,0-4 0</inkml:trace>
+  <inkml:trace contextRef="#ctx0" brushRef="#br0" timeOffset="1758">4545 1366 8792,'21'20'630,"13"-15"-450,-30 38-1,23-22-179,-24 23 0,21-8 90,-21 4-90,20 1 0,-13 16 0,6-13-180,-7-11 1,-2 0-91,3 2-180,4 15 270,-7-29-180,2 3-179,-6-17 269,1-3 90,-2-3 270,3-19 0,-3-15 180,3-31-91,-3 3-690,-1 19 1,1 1 780,-2-7-181,0-8-503,0 17 684,0 21 90,3-7-270,0 23 180,8-5-181,-1 24-89,19 5 90,-11 21-90,17 2 0,-20-8 1487,7-5-1577,-13-10 220,5-6-130,-9-4-180,6-6 90,-7-6 90,8-23 0,-5-10 0,5-15-250,-3-1 340,1 9 0,-1 1 0,5-9-90,-6 16 360,6-4-271,-7 25-89,2 2 90,-1 9-90,2 0 0,0 23 250,4-17-250,1 42-90,3-26-765,-4 7 1,0 4-315,9 7 1085,7 14 1,-4-18-1,0-1 1</inkml:trace>
+  <inkml:trace contextRef="#ctx0" brushRef="#br0" timeOffset="2030">5733 933 10771,'-16'-3'180,"2"21"-180,14 14 0,0 14 0,0 10 45,-1-17 0,2 0-2361,7-6 0,-1 0 2226,-5 12 0,0 0-45,5-12 0,1-1 556,5 32-781,-10-3-180,20-3-135,-18-23 1,-1 0-46,7 13 720,3 16 0,-7-39 0,6 4 0</inkml:trace>
+  <inkml:trace contextRef="#ctx0" brushRef="#br0" timeOffset="2225">6000 1222 10501,'0'-9'1529,"0"24"-1529,-16-13 0,12 55-90,-13-33 0,17 33-809,0-3 269,0-12-180,12-7 1,0 1-270,-6 2 792,19-12 1,5-2 0,-2 5 0,29-2 0</inkml:trace>
+  <inkml:trace contextRef="#ctx0" brushRef="#br0" timeOffset="3425">7767 1365 9781,'16'18'180,"6"7"-270,25-14-269,-5 0-1108,7 10 388,-7-13-91,3 12 1170,2-4 0,1 0 0,0 1 0</inkml:trace>
+  <inkml:trace contextRef="#ctx0" brushRef="#br0" timeOffset="3609">8025 1734 9512,'-9'-17'719,"1"1"-629,8-17-90,25 18-360,-19-14-89,46 18-1350,-8-24 809,14 17 631,-25 5 1,1 0 0,18-2 0,3-1 0</inkml:trace>
+  <inkml:trace contextRef="#ctx0" brushRef="#br0" timeOffset="3862">8327 1322 9512,'-36'-12'1079,"-1"-5"-1079,18 4 0,-5-7 180,22 9-180,-5-4 0,28 9 0,27-2 0,4 6 45,-10 8 0,0 2-45,3-4 0,-8 21 0,-1 5-563,1-3 563,-14 2 0,-3 3-90,0 10-90,-9 4-270,-1 2-225,-9-12 1,-1 0-316,5 17 990,-13-10 0,-1-2 0,4 3 0,-12 9 0</inkml:trace>
+  <inkml:trace contextRef="#ctx0" brushRef="#br0" timeOffset="4264">9478 1189 10411,'-39'0'540,"16"13"-630,-5-9 90,25 21 90,-9-6-180,12 6 90,0 12-270,18-13-90,5 17 270,-1-20-180,30 10 180,-33-17 90,28-2-179,-13-9 268,-7-2-89,9-16 90,-17-6 90,2-18 180,-12 7-90,-4-8-360,-3 16 90,-2 0 90,0 30-270,0 14-989,0 32 359,0-10 1,19 5 809,6-5 0,14-11 0,-1 6 0</inkml:trace>
+  <inkml:trace contextRef="#ctx0" brushRef="#br0" timeOffset="4810">10343 1075 9602,'-26'-17'719,"-15"0"-629,12 9 0,-9 0-90,-10 8 0,15 15 0,8 8 0,-2-3 0,24 37 0,-8-33-135,9 10 0,4 3-45,-2 0-90,21 25 270,-1-28-535,5 9 445,-11-18-90,0-3-90,-11-3-90,11 1 270,-14-8-90,-18 2 0,-3-10 716,-17-1-626,18-17 90,-9 10 90,25-22-180,12 10 180,21-7-90,15 9 0,0-3 0,-6 14 0,-1-15 0,22 7 90,-15-4-135,-9 4 0,-1 2 225,4-4-180,13-11 90,-29 8 0,2-4 360,-18-7-1,-1 8 91,-22-18-180,12 15-90,-29-5-180,30 10 180,-30 2-630,16-3 450,-13 10 0,15 16-360,23 15-90,-3 24 0,27-7-629,-10 16 359,8-23-449,12 19 359,-15-27 720,15 9 0,-18-25 0,7 2 0</inkml:trace>
+  <inkml:trace contextRef="#ctx0" brushRef="#br0" timeOffset="5092">10743 1215 8792,'0'7'630,"14"8"-630,-10 25 0,26-7 0,-26 0 0,22-10 90,-24-2 269,15-2 91,-15 0-90,11-6-450,-9-3 90,5-25 0,6-33 0,-3-2-503,2 3 0,2 1 233,5-6-450,6 0 1,2 1 179,3 4-135,0 8 1,0 4 674,-2 12 0,8 1 0,-14 13 0</inkml:trace>
+  <inkml:trace contextRef="#ctx0" brushRef="#br0" timeOffset="5258">11650 1326 9961,'4'5'-23,"-2"-1"1,0-2 0,-2-1-1</inkml:trace>
+  <inkml:trace contextRef="#ctx0" brushRef="#br0" timeOffset="5675">11885 940 11311,'-16'-18'0,"1"0"0,-1 1 0,3 4-90,-12 4 0,10 6 90,-8 17 0,7-10-90,-2 35 0,2-18-90,1 23 0,4-6 90,5 1-90,2 23 90,3-16 0,8-8 0,4-1 180,12 3-135,0-10 0,2-2 45,13 1 90,5 4 0,-3-10 360,-11-7-180,6 5-270,-18-13 0,-8 5-450,-2-7-449,-38 3-1530,-15 5 2429,-18-1 0,27-5 0,1 1 0,-24 3 0</inkml:trace>
+  <inkml:trace contextRef="#ctx0" brushRef="#br0" timeOffset="8625">2372 4438 7263,'0'-37'719,"13"0"-539,-10-2-951,11-3 1221,-3-4 362,-8-1-362,14 0 0,-15 3-1,8 3-89,-9 4 97,3 1-457,-2 8 0,-1 4-90,1 8 90,-2 5 941,0 4-1031,1 5 180,1 18-90,2-11 0,1 53 90,0-30-1213,1 38 943,0-22-450,0 4-449,1 0-571,-1-13 0,0 1 1650,4 17 0,-3-18 0,0 0 0,5 11 0</inkml:trace>
+  <inkml:trace contextRef="#ctx0" brushRef="#br0" timeOffset="9176">3282 3996 9332,'-17'16'899,"-5"-4"-989,-14-12 90,3 0-90,9 0-90,5-15 180,6 11-90,2-21 0,1 23 1,2-21 89,1 20-90,4-25 0,1 10 90,2-6 0,0 3 0,17 10-90,-13 2 180,33 4-90,-18 3 0,16 19 0,-18 10 90,4 25-90,-19-8-227,7 6 227,-9-15 0,0 3 0,0-2-90,-17 16 0,-3-15-45,1-8 0,0-2-45,-2-1-809,-11 5 989,17-21 0,-12-1-90,8-27 0,8-3 270,5-20 180,25 3-270,5 6 316,23 13-316,2 10 0,-8 9-90,13 0 0,-22 17-630,24 3-89,-23 1-500,10 12 1219,-12-20 0,-1 14 0,1-8 0</inkml:trace>
+  <inkml:trace contextRef="#ctx0" brushRef="#br0" timeOffset="9598">3740 3907 9242,'-11'-2'-90,"2"1"180,9-1 0,0 0-180,21-1 270,-1 2-270,24 0 90,-7 1 0,-13 16-180,8-12-270,-19 24 180,4-9-180,-8 19 271,-9-4-91,-17 13 180,13-20 90,-12 8-90,4-8 90,9-7 0,-9 5 90,12-13 0,16 4 90,-12-7 89,25 4 181,-25-4 0,10 2 90,-3 2-450,-8-3 0,8 14-90,-11-8 0,-16 9-180,12-4-270,-32 1-180,31 2-179,-33-2-361,34-2 1170,-32-3 0,32-4 0,-13-3 0</inkml:trace>
+  <inkml:trace contextRef="#ctx0" brushRef="#br0" timeOffset="9960">4660 3729 9781,'-21'-1'450,"-7"0"-360,25 16 0,-8 7-180,11 23 90,0-6 0,0-4 0,0 1 0,0 2 0,0 29 0,0-41-90,0 8 270,0-18-270,0 1 90,0-10-90,0-1-270,20-3-89,0-1-1,15-1-630,4-1 361,-11-14-1,9 10 720,-10-10 0,-1-1 0,-2-4 0</inkml:trace>
+  <inkml:trace contextRef="#ctx0" brushRef="#br0" timeOffset="10142">4920 3985 8792,'-17'10'1439,"4"1"-1439,13 14 0,0-6-180,0 5-180,0-4-179,0 3-181,0 1-539,19 10 180,-14-8 1079,29 6 0,-20-15 0,14-1 0</inkml:trace>
+  <inkml:trace contextRef="#ctx0" brushRef="#br0" timeOffset="10542">5398 3933 10681,'-19'-6'809,"14"1"-899,-14 2 90,6 2 0,10 15 0,-9 5 0,32 20 0,-14-10 0,28 3 90,-31-10-180,22 8 90,-12-10-269,1 11 89,-4-16-1169,-10 5 629,0-11-809,0-2 719,-23-4 450,-3-22 450,-14 14 270,15-20 0,1-4 0,-7 5-180,6-11 0,2-2-1,-1-4 181,-3-12 450,19 4-540,2 15-90,6-16-270,0 26 270,21-7-270,3 17-270,24-1-180,-13 9-180,3 3-1168,5 3 1888,-8 0 0,10 15 0,-12 5 0</inkml:trace>
+  <inkml:trace contextRef="#ctx0" brushRef="#br0" timeOffset="10864">5922 3728 10501,'-39'-8'450,"4"2"-450,14 25 0,-5-14 0,24 36-90,-19-24 90,19 21-90,-7-8-360,9 14 180,0-9-269,23 20 449,7-24 90,0 5-135,3-22 0,0-2 135,-7 5 0,12-8 0,3-3 0,-2-1 90,21-4-90,-31-15 539,1-7-449,-20-9-180,-25 10 0,-20 10 90,-14 10-539,-5 0-541,20 7 1,1 1 875,-16-4 1,16 13-1,2 3 1,-10 6 0</inkml:trace>
+  <inkml:trace contextRef="#ctx0" brushRef="#br0" timeOffset="12786">7908 3681 9332,'-49'0'809,"8"-1"-449,-4 1-90,7 0-90,0 17-641,-2-12 371,2 30 0,1-30 90,5 33 152,3-22-242,8 16 0,8-9 180,6 6-90,7-8 76,19 10 14,16-17-90,9 3 0,-6-14 0,0-2 90,10 1 0,-8-9 0,-1-2-90,2 5-810,10-28-846,-34 17 1656,-2-15 0,-34 6 0,-4 0 0</inkml:trace>
+  <inkml:trace contextRef="#ctx0" brushRef="#br0" timeOffset="12975">7687 4320 9242,'14'5'1709,"0"-2"-1709,15-1 0,-7-19 0,-1 13-90,-1-27-540,4 28-1349,20-45 630,-5 26 1287,-11-1 0,0-2 1,18-6-1,3 2 1</inkml:trace>
+  <inkml:trace contextRef="#ctx0" brushRef="#br0" timeOffset="14109">8993 3886 7713,'15'-22'719,"-11"-15"-359,43-1-180,-28-8-304,3 17 0,3 0 214,-6-7 0,-2-1 90,11-22-45,-8 5 0,-3 0-135,-2-10 315,-7 10 0,-3 0 95,-2-4-455,-9 7 0,-5 2-45,-9 8 71,-17-14 19,0 45 0,17 27 0,-9 4 0,25 26 0,-9-2-1175,13 6 1175,0 7 0,-2-13 0,4 1 0,10-13 0,3 1-135,1 24 0,3-1-45,5-26 0,2-2 90,-1 9 0,-1-2-270,12 8 91,0-8-901,2-5 1080,-1-7-707,-1-7 258,1-5-254,14-7 793,-12-4 0,22-24 90,-29-6 135,-9 3 0,-1-3 135,-2-12 179,2 1 1,-14 17 961,-4 2-1591,-2 1 952,-2 29-773,0 7-89,0 28-179,18-10 572,4 3-573,22-17 0,-9-4-89,2-9-91,16-7 270,-21-21 90,18 16 0,-27-32 180,3 14 0,-10 2 269,4-13-359,-15 21 495,3-4-585,-7 25 90,1 15-90,16 21 0,-13-10 90,27 1-90,-29-14 0,29-2-90,-18-9 0,29 5-90,-15-13 90,20 6 90,-18-26 0,13-7 0,-20-10 90,2-1 360,-13-5 89,-7 12 181,-1-18-720,-4 24-180,-15-7 180,11 18 0,-11 17-90,15 8 180,21 5-90,-16 12 0,31-26-360,-13 28 270,5-18-270,15 8 271,-19-10-181,19-7 90,-20-5 270,6 0-90,-10 0-90,-2-17 90,1 13 90,1-29-90,-6 16 90,4-11-90,-11 12 0,2 5 90,-6 11-90,0 0 0,0 0 0,1 0 0,0 0-180,1 20-1529,7 4 539,0 0 1170,5 15 0,-1-34 0,1 15 0</inkml:trace>
+  <inkml:trace contextRef="#ctx0" brushRef="#br0" timeOffset="14358">9953 3386 9062,'0'-9'0,"0"-1"0,28-4 0,-1 3 90,27-2-1439,-12 8 179,-17 27 1170,-9-1 0,-16 25 0,0-8 0</inkml:trace>
+  <inkml:trace contextRef="#ctx0" brushRef="#br0" timeOffset="15228">11420 3173 10951,'-19'-17'-360,"4"3"450,5 4 90,3 2-180,4 26 90,25-15-90,-16 43-360,34-4-90,-14 12-1577,-3 8 1308,16-18 179,-35 1 0,28-1-179,-22 11 629,5-16-270,-8 15 450,-7-30-90,0 2 270,0-16 539,-24-4-89,4-3 1307,-24-19-1847,15-3-180,10-20 0,8 8 0,11-2 0,0 7-90,19-2 0,-15 0-90,40-2-284,-23 1 194,25 0-90,-9 1-45,-8 9 0,1 0 46,15-10 224,-6 6 0,-1 1 135,3-4 135,-10 6 0,0 1 134,0-1 1,2-4 810,-15 5-720,-9 7 719,-2-5-629,-6 9-91,-1-1-359,0 5 375,0 15-375,0 25 0,0 3 0,0 15-237,13-15 237,-10 1-180,11 1-449,1 15 359,2-15-45,-3-8 0,2-3 135,6 1 90,-4 4-90,-4-17 1,-1-5-91,2-3-90,6-6 270,-4-2 327,12-19-327,-10-12 269,11-24-89,-13 7-737,6-2 737,-11 20-90,1 1 180,-5 14 270,3-8-360,-6 19 0,6-9 0,-7 11-180,9 21 90,-4 7 0,4 14 0,1-2-270,-1-7 737,5-2-1456,13 10 359,-3-13 630,28 4 0,-18-16 0,11-2 0</inkml:trace>
+  <inkml:trace contextRef="#ctx0" brushRef="#br0" timeOffset="15562">12892 3403 9242,'-53'-11'989,"-1"3"-899,13 8-90,2 15 90,13-12-180,12 28 90,-9-27-90,13 47-90,-4-34-269,8 36 269,28-34-810,6 7 630,27-18 91,-11 1 89,0-9 180,8-20 0,-30-5 449,26-21-89,-41 10 1259,8-7-1529,-11 16-180,-4 1 630,-14 13-630,11 28-450,-11 6 91,34 22-271,-15-11 90,27-1 1,-30-10 629,37-3 0,-22 1 0,23-1 0</inkml:trace>
+  <inkml:trace contextRef="#ctx0" brushRef="#br0" timeOffset="15912">13292 3353 10141,'-14'24'180,"10"11"-180,-10-11 90,14 15-180,0-5-360,0 3 181,0-17 89,0 2 90,0-9-900,14-7 810,1 0 180,10-23-90,-11-8 180,12-25 0,-17 10 270,20-13-270,-19 27 90,4 1 360,-9 7-271,1 15 1,-3-7-90,2 10-180,-3 0 0,3 21 0,-2 7 0,3 10-180,0 1-269,3-11-181,2 0 90,3-2-89,2-2-1,4-5 630,19 1 0,-7-11 0,13-1 0</inkml:trace>
+  <inkml:trace contextRef="#ctx0" brushRef="#br0" timeOffset="16242">13823 3344 9871,'-36'-6'270,"14"16"-270,10 10-180,12 18 0,0-6-89,17 7-1,-13-16 180,28-3 0,-29-2 90,31-15-180,-30 13 180,30-15 0,-19 5 180,5-20 539,-3-8-89,-15-18 90,5 5-271,-7 1-359,0 12 0,-18-1-180,13 27 90,-12 15 90,17 21-180,0 11-359,0-7-136,0-11 0,0 1-134,0 16-226,6-11 1,1-2-136,-4 3 1080,11 2 0,-2-18 0,2-4 0</inkml:trace>
+  <inkml:trace contextRef="#ctx0" brushRef="#br0" timeOffset="16476">12523 2817 8162,'-12'11'630,"4"3"-540,25 11-270,31-1 0,2-1-270,-6-13 1,0-1-91,6 5 540,-7-8 0,-1-1 0,5 1 0,12 0 0</inkml:trace>
+  <inkml:trace contextRef="#ctx0" brushRef="#br0" timeOffset="16644">12920 2785 8162,'18'-5'1799,"1"0"-1889,3 19 90,15-11-539,-19 10-271,22-2 810,4-8 0,-6 18 0,11-9 0</inkml:trace>
+  <inkml:trace contextRef="#ctx0" brushRef="#br0" timeOffset="17525">13007 2799 8882,'-5'-3'540,"0"1"-360,3 0-1,-1 0 91,3-1-90,0-1 0,0 0 0,20-1-270,-14 1 90,34-2 90,-10 4 90,18-1-180,-2 3-1439,-14 16 179,-16 8-179,-9 12 1439,-30 5 0,18-2 0,-17 3 0</inkml:trace>
+  <inkml:trace contextRef="#ctx0" brushRef="#br0" timeOffset="17979">15250 3203 10141,'-50'14'0,"1"-11"0,19 10 0,0 2 0,-13 4 0,13-1 0,3 3 0,3 11-180,3 17 90,16-20-179,20 9-811,19-8 361,10-10 719,-4-9 0,2-3 0,12-2 0,-15-5 0,0-1 0</inkml:trace>
+  <inkml:trace contextRef="#ctx0" brushRef="#br0" timeOffset="18713">15508 2499 10321,'-17'-15'-90,"13"3"450,-24 6-180,25 31-90,-8-1 90,11 30-737,0-6 647,0 11-90,0 6-437,11-30 0,0 1 482,-9 2 0,2-1-90,17 0 0,-1 0 45,-17-1 0,-1 3 45,21 11 0,2 0-45,-16-13 0,-1 0 0,11 8 0,2-2-270,-2 9-90,-3-9 1,-1-6-91,-2-5 90,0-13-629,-3-4 1275,0-11-376,-2-22 90,0 14 0,0-41 1144,1 23-1144,-1-10 0,0-3 180,5-8 90,-3 7 0,-1 0-270,3 0 450,1-10-181,-6 32-179,1 0 180,-3 14-270,2 0 180,4 15-270,-2 8 90,4-4 90,-2 24-90,2-26 90,6 33-90,-1-21-360,4 6 0,5-9 181,-6-14-361,17 5 270,-14-15 270,15-18-90,-16 11 180,2-37-90,-10 25 90,-4-19 90,-2 10 629,-2-6-359,-4 4-360,-1 25-90,-2 16 0,0 37 0,0-10-360,18 13 180,4-26-89,1 6-91,16-22-180,-23 5 0,22-14-449,1 6 719,-7-8-90,18-22 360,-22-7 315,-7 2 0,-3-3 135,-2-15 179,0-1 631,-13 2-721,-2 14-269,-1-10 0,0 22 0,-15 3-360,11 32 90,-12 21-450,16 4-359,0 17 89,20-28 0,-16 6-269,35-13 989,-34-5 0,36-3 0,-13-3 0</inkml:trace>
+  <inkml:trace contextRef="#ctx0" brushRef="#br0" timeOffset="18994">16935 3070 9871,'-42'-8'720,"2"1"-630,15 22 90,-7-11-90,28 29 0,-17-6-90,19 9-360,-5 13 360,7-20-180,24 6 90,-18-13-90,45-5 90,-28-1-180,37-9 90,-22-2-89,18-5 89,-35-15-270,12-8 360,-31-19-360,-9-5 90,-23 9 45,4 16 1,-4 4-46,-20 4 360,17 1 0,3 2 0,6 9 0,-4-6 0</inkml:trace>
+  <inkml:trace contextRef="#ctx0" brushRef="#br0" timeOffset="19208">17347 3097 10321,'2'33'-809,"-1"4"179,-1-11-1259,0 11 1889,0-15 0,14 6 0,4-10 0</inkml:trace>
+  <inkml:trace contextRef="#ctx0" brushRef="#br0" timeOffset="19375">17730 2975 10411,'0'-6'-809,"-14"1"-1080,10 19 1889,-23 3 0,12 17 0,-13-1 0</inkml:trace>
+  <inkml:trace contextRef="#ctx0" brushRef="#br0" timeOffset="19610">16840 2597 9781,'0'-22'810,"-1"0"-270,0 8-181,0 0-269,17 10-180,2 1-989,19 23 449,-19 2-989,18 21 720,-14-10 899,18 10 0,-12-18 0,-2 7 0</inkml:trace>
+  <inkml:trace contextRef="#ctx0" brushRef="#br0" timeOffset="19797">17328 2451 8702,'8'-8'720,"0"1"-451,-2 7-89,6 0-180,-1 0 90,12 15-90,-6 1-539,20 14-181,-12-14-1888,32-4 2608,-20-12 0,19 0 0,-16 0 0</inkml:trace>
+  <inkml:trace contextRef="#ctx0" brushRef="#br0" timeOffset="20208">18490 2880 10321,'17'9'1439,"-13"10"-1259,27 17 0,-27 5-180,20-7 0,-21 2 90,20 0-90,-20-3 180,22-2-90,-16-5-90,13-4 90,3-4-90,-3-9-540,16-4-90,-12-21-449,7 12 0,-9-40-91,0 16-372,0-26 1542,0 6 0,1-2 0,0-2 0</inkml:trace>
+  <inkml:trace contextRef="#ctx0" brushRef="#br0" timeOffset="20609">19502 2817 9332,'2'13'1529,"-21"-6"-1169,-10 5-181,-12-7-134,10 6 0,0 2-45,-10 4 0,6 3 0,0 2 0,-4 8-2097,-7 13 2007,21-10-90,7 0 736,8 0-1005,4 12 359,6-15-450,28 16 180,-20-27 180,52 2 0,-32-15 152,29-3-242,-10-3 270,-4 0 0,1-20 90,-4 15 0,-16-20 0,0-3-90,6 7 720,3-37-451,-20 29-269,-6-11 0,-3 17 1075,-22 6-1345,0 26-539,-4 15-271,9 19 361,13 0-181,21-18 900,-15 8 0,42-29 0,-13 11 0</inkml:trace>
+  <inkml:trace contextRef="#ctx0" brushRef="#br0" timeOffset="20842">20017 2989 10681,'-43'-7'270,"3"0"-90,8 7-180,15 17-270,5-2 180,12 15-90,26-16 90,-20 6 0,43-18 90,-43 13 0,43-14-630,-22 6-359,19-7-180,-21-18 539,-10-2-269,-38-1 899,18-17 0,-48 19 0,15-19 0</inkml:trace>
+  <inkml:trace contextRef="#ctx0" brushRef="#br0" timeOffset="20974">19273 2392 9422,'38'8'-1170,"-1"-1"1,24-4 1169,-17 5 0,2-1 0,-11-7 0,-1 0 0,4 0 0,-1 0 0</inkml:trace>
+  <inkml:trace contextRef="#ctx0" brushRef="#br0" timeOffset="21712">21837 2641 7713,'9'0'2248,"-2"0"-1888,-1 0 540,-3 0-900,-22 0-90,-6 0 90,-29 0 0,10 22 0,13-7 0,3 3-386,-7 26 296,-3 2-90,19 5 0,9-14-643,4 22 464,34-33-451,17 6 360,13-24 180,9-2-45,-30-16 1,0-4 134,20-5 180,-11-8 0,-2-4-180,1-7 225,-14 3 0,-3-1-461,-5-10 686,-4-14-180,-14 19 180,-5 1-180,0 2 270,-20-12-90,-5 14-91,2 9 1,0 2 90,-2-3-92,-14-9-358,22 18 452,-5-1-182,10 10 552,4 5-732,6 27 90,13-17 90,-7 47-90,14-28 0,3 28-109,-16-10-161,31 4-90,-32 0-360,26-2-359,-27 1 1079,32 11 0,-24-15 0,17 9 0</inkml:trace>
+  <inkml:trace contextRef="#ctx0" brushRef="#br0" timeOffset="22325">22565 2103 8972,'0'22'1439,"0"4"-1349,0-4 90,0 7 0,0 2 0,0 4-90,0 7 0,0 5-45,0-10 0,0 2-457,0 22 412,0-9 0,0-1-686,0 9 686,0-23 0,0-1 0,0 25 0,0-20 284,0 14-284,0-31-1260,0 3 1080,0-34 90,0-12 90,0-15 0,0-24-89,19 19 133,-9 0 1,4 2 135,31 2 540,1-11-360,-9 37 90,3 3-181,-19 6 328,4 20-237,-13-15 487,-2 31-847,-5 0-90,-2-1-450,-29 22-180,-12-30-1319,-18 6 150,-1-13-360,10-3 2249,0-3 0,2-7 0,2-4 0</inkml:trace>
+  <inkml:trace contextRef="#ctx0" brushRef="#br0" timeOffset="22462">23247 2668 11760,'18'23'-1709,"-1"14"270,-6-32 1439,-5 24 0,-3-26 0,-3 7 0</inkml:trace>
+  <inkml:trace contextRef="#ctx0" brushRef="#br0" timeOffset="25892">2323 5319 6993,'21'3'720,"-3"-1"-541,-1 0 91,2-2 0,6 0 0,8 0 180,7 0-1781,6 0 1421,6-13-90,4 10 90,6-8 0,3-2-90,-22 7 0,2 1 30,14-2 0,7-2 0,-6 2-30,-11 2 0,0-1 0,8-2 0,5-1 0,-4 2 0,-5 3 0,3-1 22,-1-2 1,8-2-1,1-1 1,-7 2-23,8 0 0,1-1-652,-6 1 0,9-1 0,-1-1 1,-7 1 651,4-1 0,0-1 0,-11 2 0,5-1 0,0 0 0,-5 1-459,-8 0 0,-3 1 0,1 0 459,13-3 0,3 0 0,-4 1 0,2-2 0,-3 0 0,-1 1 0,-1 1-45,-4 0 0,2 0-45,12-3 0,-1 1-87,-18 5 0,-1 0-3,22-4 1,-4 2 179,-4 4-45,-16 2 0,-3 1 45,-2 2 407,3 0-407,-19 0 2421,-4 0-2421,-3 14 1942,1-10-2032,-4 10 195,5-5-195,-6-7-106,11 14-254,-8-15-180,9 6 630,-6-7 0,2 0 0,0 0 0</inkml:trace>
+  <inkml:trace contextRef="#ctx0" brushRef="#br0" timeOffset="27158">4297 5903 8612,'-9'2'630,"2"0"-181,2-1-89,3 3-90,1 0-180,1 3 90,0 5 0,0 3-90,17 7-90,-13 5 90,12 7-90,0 5-233,-13 6 233,13 2 0,-3 3 0,-12-16 0,2-1 0,18 19-45,-17-16 0,-1 0 135,6 0-270,-1 6 0,-4-25 90,3-2 0,-2-11-89,0-2-91,0-2 0,3-20 270,1 2 0,9-42-90,-3 16 135,0-1 0,0-1-516,5-11 381,-7 19 1,0 2 179,7-7-180,-2 7 180,1 8-90,3 8 0,-5 10 89,9 5 91,-12 22 0,8 13-90,-9 9-865,1 11 775,-5-9 0,-2 4 0,-2 0 221,1 15-221,-2-19-130,2 18 40,-3-36-180,1 4 90,-2-20 619,1-2-798,1-5 722,1-25-363,5-13 0,-2-16 0,1 15 0,0-2 0,-2 7 0,1-1-45,1-3 0,0 1 180,5-14 315,-3 21-450,-7 22 0,4 2 90,-3 21-90,5 8 0,-1 10 0,3 3-450,6 10-90,-3-7 90,0-7 1,1 0-181,7 6 422,10 5 0,-5-19 0,3-3 1</inkml:trace>
+  <inkml:trace contextRef="#ctx0" brushRef="#br0" timeOffset="27492">5490 6067 9871,'-20'-8'270,"-2"-5"-270,-22 11-90,3 16 180,2 9-90,16 13 0,1-4-90,19 2 90,-5-9-180,8 15 90,19-18-269,3 8 269,21-16 90,1-2 0,-9-9 0,6-22 0,-19-7 449,3-23 1,-12 10 270,-7-7-990,-1 19-809,-5 19-181,0 18 541,0 29-181,0-5 900,0 2 0,15-10 0,4-1 0</inkml:trace>
+  <inkml:trace contextRef="#ctx0" brushRef="#br0" timeOffset="27742">5318 5692 7173,'33'0'899,"-2"0"-809,-8 15-90,2 0 0,-6 4 0,0 4 0,-4-20-180,1 21-629,10-15 89,-4 4 720,8-7 0,-6-6 0,2 0 0</inkml:trace>
+  <inkml:trace contextRef="#ctx0" brushRef="#br0" timeOffset="28225">6182 5692 10141,'-20'-9'450,"5"30"-450,15-12 0,0 34 0,0-7 90,0 6-135,6-6 0,2 1 45,-5 23-950,10-7 1,0 0 949,-10 8-45,9-12 0,1-2 45,-4 3 0,6 8 526,-3-27-796,-10-8 505,4-5-1404,-2-4 989,-1-7 0,4-17 1138,-2 6-1048,10-58 90,-1 27 0,-4-1 0,1-3 45,3 0 0,0 3-45,7-18 45,-4 13 0,0 1 135,1 3 450,5 1-450,-12 20-1,5 9-89,-8 24-90,7 11-90,-6 14-449,8 17 179,-4-19-1317,6 13 1137,0-17-179,5-4-619,7-4 1338,4-8 0,8-9 0,0-5 0</inkml:trace>
+  <inkml:trace contextRef="#ctx0" brushRef="#br0" timeOffset="28494">7150 5871 9152,'-20'-5'719,"-12"1"-539,-22 28-90,6 7-90,21-2 0,3 2 0,-2 16 0,3 16 90,15-28-270,8 6 90,0-16-180,21-4 181,-16-2-91,57-5 180,-38-6 0,12-4 0,0-4 0,-4-15-180,8-9 180,-18-9 90,-10-2-540,-3-6 180,-9 10-629,-23-18 179,-3 23 720,-20-10 0,21 19 0,6-2 0</inkml:trace>
+  <inkml:trace contextRef="#ctx0" brushRef="#br0" timeOffset="28858">7578 5957 9871,'-16'12'810,"12"-3"-900,-12 0 90,-5-1 0,16 1 0,-29 0 0,31 2-180,-9 1 0,2 0 0,8 0-90,-8 1 91,10-2-181,0 3 180,24 0 0,-18-2 0,37 0 90,-14-8 90,33-2 0,-19-21 360,13 2 90,-37-5 449,5-2-899,-14 11-360,-3 13-269,-5 13-721,-2 29 451,0-6 899,18 0 0,-14-23 0,14-2 0</inkml:trace>
+  <inkml:trace contextRef="#ctx0" brushRef="#br0" timeOffset="29042">7967 5187 11131,'-37'-1'0,"-15"21"-180,20-15-450,3 22 0,0 4-2692,-4-6 2602,11 3 1,3 2 719,-4 7 0,4 1 0,4 0 0</inkml:trace>
+  <inkml:trace contextRef="#ctx0" brushRef="#br0" timeOffset="31927">8705 6027 7982,'-19'-3'1889,"25"1"-1799,26 2 0,14 0-2421,9 0 2331,-3 0 90,13 0-135,-31 0 0,1 0 90,3 0 0,3 0-45,20 0 0,3 0 45,-15 0 0,3 0-45,6 0 0,5 0 0,-4 0 0,-3 0 0,-3 0-866,-5 0 1,1 0 0,-2 0 910,5 1 0,-3-2-135,2-5 0,0-1 319,-2 6 1,3-1-200,-6-4 0,4-3 0,-3 2-75,7 5 0,1 1 45,3-4 0,5-2 0,-5 0-90,-8 2 0,-1-1-60,3 0 0,3-1 1,-5 1-31,-7 1 0,-2 0 0,9-2 0,-1 1-315,-10 4 0,-3 0-44,13-4 525,14 4 1,-38 1 0,2 1 0</inkml:trace>
+  <inkml:trace contextRef="#ctx0" brushRef="#br0" timeOffset="38674">12093 5415 8882,'15'-20'809,"-3"1"-809,-12 4 0,5 1 270,-4 5 0,5 1 0,-3 5-90,0 2-180,5 38 0,-1-12 0,-3 14 0,0 3 0,0 6 45,0 8 0,-2 2-45,0 1 0,-1-3 0,1-3-90,-1-10 180,0 18-90,2-33-90,-1 0-90,-1-16-1079,1-6 1259,-2-19-180,1-12 180,-1-13-90,0-4 90,0 4 0,0-2-90,0 0 0,19-2 180,-14 3-180,25 3 0,-16-5 180,0 15-90,5-1 0,-9 19 90,7 3 0,-5 5 0,-2 21-90,-4-16 0,-1 38 90,1-25-90,-1 33 0,-2-21 0,1 16-90,-4-24 90,1-2-360,0-5 180,2-13 0,-2 6 90,4-8 0,5-21 90,2 16 90,13-56-90,-6 36 0,8-33 0,1 10 0,-6 14 360,8-10 0,-16 29-180,4-4-90,-10 18 0,6 10 0,-8 13-90,7 23 0,-9-5-630,8 18-180,-5-21-508,6 10 779,-1-16-91,6-3 630,3-3 0,5-3 0,3-2 0</inkml:trace>
+  <inkml:trace contextRef="#ctx0" brushRef="#br0" timeOffset="39107">13325 5615 8612,'-22'-8'1169,"-7"2"-1079,-25 6 0,-4 17-180,12-12 90,-6 27 0,35-10 0,-14 7 0,28 0 0,-8-7 0,11-3-180,0 9 180,20-10-269,3 9 269,2-16-180,12-1 180,-10-8 0,10-2-180,7-18 180,-21-9-90,13-26 90,-25 4-45,-1 13 0,-1 0 45,-7-14 315,1-6 0,0-1-46,-3-4 1,-8 4 0,-1 3-180,4 8-135,-10 15 0,0 2-45,12 5 360,-11 0-180,14 43-90,0 29 90,15 6-358,-13-20 0,0 0 178,13 10 90,-3 1-180,-9 0-180,10-1-629,-4-2 269,-7-1-1390,13 10 2110,-5-14 0,3 6 0,3-16 0</inkml:trace>
+  <inkml:trace contextRef="#ctx0" brushRef="#br0" timeOffset="39391">13785 5432 9242,'-26'-2'270,"-9"0"-270,15 2-90,-11 0 90,12 13 0,-2-10 0,19 22 0,-7-5 90,9 15-90,17-3 90,7 22-180,19-23 90,-19-3 0,-1-1 90,3-2-1,10 12-89,-24-19-89,5 4-181,-8-11 90,-9-2-270,0 0-629,-23 1 179,18-2 900,-43-1 0,27-5 0,-22-1 0</inkml:trace>
+  <inkml:trace contextRef="#ctx0" brushRef="#br0" timeOffset="39531">13595 5393 7533,'33'-15'0,"16"-5"-180,-12 5-540,-4 4 1,-1 1 719,4 0 0,12 0 0,-18 7 0</inkml:trace>
+  <inkml:trace contextRef="#ctx0" brushRef="#br0" timeOffset="40149">14835 5168 9871,'-37'0'-90,"9"0"180,-11 20-90,19 9 0,3 0 0,3 3 0,0 21 45,6-12 0,1-1-2606,4 12 2111,2 14-1102,18-6 922,13-16 0,-3-11 1,3-2 629,23 2 0,-24-15 0,1-1 0,15 3 0</inkml:trace>
+  <inkml:trace contextRef="#ctx0" brushRef="#br0" timeOffset="40357">15555 5237 8432,'20'-23'450,"-1"2"-270,5 2-90,-8 8 180,4 2-90,-7 7-1,-1 2 1,-1 0 0,3 16-180,-5 11 0,0 28-360,-8-4-360,-10-9 1,-1 1-1060,5 15 1329,-17-17 1,-3 0 449,-1 19 0,1-27 0,-3-2 0,6 1 0,-1 0 0</inkml:trace>
+  <inkml:trace contextRef="#ctx0" brushRef="#br0" timeOffset="41258">8605 6162 8072,'-6'-7'900,"1"2"-630,0 0-180,1 2-180,1-1 0,2 1 1079,0 0-899,25 18-90,3 4 0,2 3 45,2 0 0,1 1-1183,10 9 0,1 1 1138,-11-9 0,0 0 45,4 2 0,0 0-45,1 2 0,3 1 0,-1-1 0,3 2 0,-1-2-520,7 6 1,3 0 541,-10-6 1,6 2 0,-1 0-1,-3-2-701,12 6 1,0-1 648,-7-4 0,2 1 0,-2-3 30,6 3 0,-2-2 0,1 0 0,0 0 45,0-1 0,1 1-90,0-2 0,0 1 90,0-1 0,1 0-90,-2-1 0,3 1-165,-5-3 0,3 2 0,-3-1 30,7 3 1,2 1-46,-14-7 0,5 2 0,0-1 0,-6-1 0,10 5 0,-3-2 105,-7-4 0,2 1 0,-4-1-150,1 0 1,-3-1-1,-1 0 0,-1-1-457,-2-1 0,0-1 727,-2-1 0,-1-1 0,-1-1 0,0 0 0,-2-1 0,1 0 0</inkml:trace>
+  <inkml:trace contextRef="#ctx0" brushRef="#br0" timeOffset="42007">12720 7277 9332,'11'-17'719,"-3"2"-539,-5 1 0,-3-2-180,-21 4 0,-1-4-180,-26 9 90,2 1 90,7 6-90,-8 14 90,31 5 0,-14-1 0,27 16 0,-7-17 0,10 18 0,27 8-90,-4-10 90,10-1 0,4-2-405,10 4 450,-4-4 0,1-2-745,9 1 700,-19-10 0,-2-1 270,6-1 269,-7-1 91,-8-5-630,-11 0-90,-6-6 563,-6 3-923,-26-7-179,-8 1-271,-17-2-376,-2 0 197,12-16-1,-1 12 1019,4-31 1,3 17 0,4-18 0</inkml:trace>
+  <inkml:trace contextRef="#ctx0" brushRef="#br0" timeOffset="42408">13123 6910 8612,'7'15'1979,"-2"8"-1889,-5 12 0,14 3-180,-10-3 90,10 2 90,-2 2-90,-9 18 0,21-15 0,-21 14 0,15-7-90,-17-13-180,9 18 0,-8-28-359,4 8 359,-3-18 270,-1-2-90,1-9 0,-1-3 90,1-2 0,8-18-90,-3 14 180,16-35-90,-7 11 0,7-9 0,-6 12 90,-2-2-90,-2 23 270,-3-20-180,-2 22 0,-2-6-1,0 8-89,-3 0 0,6 21 0,-6-15-359,4 37-541,-2-24-89,2 19-1,0-7 990,3 1 0,1 1 0,2-1 0</inkml:trace>
+  <inkml:trace contextRef="#ctx0" brushRef="#br0" timeOffset="43108">14210 7357 9062,'-21'-16'899,"15"-4"-539,-33 18-270,13-6 90,-11 8-180,-1 0 0,7 0 0,0 15 0,-11 8 0,12-2-799,-5 21 799,19-24-143,4 19 53,7-12-180,2 8 90,22-10-38,8 4 128,13-12 0,19-9 0,-18 0-591,13-23 681,-15 13 0,-2-31 0,-2 18 353,5-31 6,-14 17 451,5-21-270,-19 24 52,-2-13-592,-8 20-52,-2 1-398,0 29 549,0 11-1809,0 25 811,0-9-180,0 2 1156,0-14 1,16-1-1,5-2 1</inkml:trace>
+  <inkml:trace contextRef="#ctx0" brushRef="#br0" timeOffset="43424">14788 7353 8972,'0'-15'360,"0"-2"-1,0-3 361,0-18-450,0 6-90,0-13 180,0-4-91,0 11-89,0-25 90,0 16-90,0 1-360,0 9 180,-14 18-90,11 5 0,-11 4 180,14 4 0,0 22-180,0 13 90,0 15-270,0 7-1379,0-8 750,0 6 224,7-14 1,0 2-328,-3 19 57,9-10 1,1-1 944,-4 6 0,4 11 0,-7-21 0</inkml:trace>
+  <inkml:trace contextRef="#ctx0" brushRef="#br0" timeOffset="43577">14705 7678 9242,'24'-18'-90,"12"-10"0,14 6-450,-11 3 0,1-3-269,12-14 809,-4 11 0,2 1 0,7-5 0,-18 11 0,-1-1 0</inkml:trace>
+  <inkml:trace contextRef="#ctx0" brushRef="#br0" timeOffset="43897">15830 6585 9332,'-45'21'1169,"-7"9"-899,12 13-2773,-5 5 2683,11-5-270,0 6 90,2 3 90,3 3-90,4 2 0,7 0 89,8 2-358,6-2-1,1-15 0,6 0 242,10-10 0,5-1-332,3 21 0,5-2 0,5-21 0,3-3-289,3 8 0,-1-2 289,-6-12 1,0-3 359,2-1 0,2-1 0,1-3 0,0-1 0,1 0 0,1-1 0</inkml:trace>
+  <inkml:trace contextRef="#ctx0" brushRef="#br0" timeOffset="45791">16860 6599 8972,'27'-4'270,"-3"2"0,-2 1 89,-3 1-89,-3 0-270,2 24 90,0-4 90,-4 11 0,-3 3 0,4 15-660,-7-14 0,-1 2 480,-4 26 45,-2-29 0,-2 2-45,-6 21 0,-5 1-180,-3-12 0,-4 1-1014,-2 7 0,-3 4 1,-1-4 608,-7-4 0,-2-1 585,0 5 0,-3 5 0,2-5 0,1-5 0,-1-3 0,5-6 0,-1 1 0,1-1 0</inkml:trace>
+  <inkml:trace contextRef="#ctx0" brushRef="#br0" timeOffset="48141">17770 4987 7713,'0'-9'90,"0"1"269,0-1 1,0 1 0,0-1-90,0 0-90,0 1 0,14 0-90,-10 1-1,10 2 361,-14-1-360,0 20-90,0 13 0,0 38 0,0-2-1125,0-7 0,0 1 1080,0-19 0,0 1 90,1 14 0,-2-1-391,-6-13 1,0-2 345,5 0 0,0 0 0,-5-3 0,0 2 0,6 11 0,2 0 0,-2-14 0,2 1-90,8 21 0,6-2-90,16 3 135,-9-19 0,1-2-314,21 7 179,-9-4 90,2-7-180,17-2 270,-12-13-90,-8-8 0,0-3 0,2-3 133,17-17-43,-31-6 0,2 2 180,-16-18-180,-4 14 90,-3-18-90,-23 18 2392,-6 0-2302,-26 21-90,11 19-364,-1 7 364,11 29 44,11-9 1,1 2-45,5-7 0,1 3 0,-1 10 0,-1 6 0,3-4 0,2-1 0,1 2 0,0 7 0,-2 5 0,3-5-848,1-3 1,2-2 787,0-8 0,0 1 0,0-2-255,1 4 0,1-3-135,-1 0 1,-1 0-46,2-1 0,-1 0 495,0-1 0,0 0 0,0-1 0,0 0 0,0-1 0,0 1 0</inkml:trace>
+  <inkml:trace contextRef="#ctx0" brushRef="#br0" timeOffset="49157">18973 5837 8702,'16'-1'270,"-4"20"-270,-1-14 0,-4 40 90,0-22 90,-1 26 0,0 13-180,-2-12-1423,-1 15 1333,-3-23 90,0-4 536,0-5-536,-14-1-90,10-12-810,-10-2 810,14-33-89,0-31 179,0-6 0,7 6 0,4 1 0,8-8 0,1 10 0,0 2-868,-1-4 778,15-6 1464,-21 20-1284,20 16 270,-9 1-270,-3 14 180,2 23-180,-12-17 0,4 40 0,-8-24-90,2 20 0,-6-8 0,3 14 0,-4-12 775,2 16-865,-3-26 55,1 0 35,-1-14-180,1-7 90,2-1 0,2-4 90,5-25-90,11-6 90,-1-16 45,-1 14 0,0 0-45,7-8 90,-6 6 0,-1 2-90,2 0 0,2-3 450,-11 18-181,-4 9-89,0 4 360,0 5-450,-2 0-90,5 15 0,-4 12 0,2 5 0,-1 3 0,1 17-270,0-8 0,0 0-449,1-1 269,-1-9 0,1-1 90,7 1-809,17 8 539,-10-28 630,12-2 0,-10-12 0,3 0 0</inkml:trace>
+  <inkml:trace contextRef="#ctx0" brushRef="#br0" timeOffset="49483">20065 5937 9242,'0'-28'989,"-22"9"-719,-1 3-180,-23 11-90,7 27 0,2 4-90,16 13 270,-2-2-360,21 5 270,-7-13-90,9 19-360,19-25 360,-15 4 0,32-18-90,-32 1 0,33-9 0,-12 4 90,-1-24 0,12-7 0,-20-11 90,12-13 180,-14 19-90,-1-7-180,-9 15-90,1 0 90,-2 6 0,-2 25-180,2 15-270,-1 15-719,4 16 449,-1-20-719,3 20 1439,-2-27 0,-1 5 0,-2-14 0</inkml:trace>
+  <inkml:trace contextRef="#ctx0" brushRef="#br0" timeOffset="49741">19805 5334 7982,'21'-18'540,"-15"5"-360,35 2 630,-20 5-451,15 3-359,-10 1 0,-5 2 0,-8 16 0,8 0 0,-6 3-449,17 6 179,-11-8-990,23 10 451,-13-11-450,11 0 1259,-9-15 0,3 4 0,1-5 0</inkml:trace>
+  <inkml:trace contextRef="#ctx0" brushRef="#br0" timeOffset="50193">20848 5230 8702,'0'18'1259,"0"-1"-809,0 3-90,0 3 0,0 24-270,0-5-45,0 1 0,0 2-2116,0 12 2071,1-18 0,-2 2 0,-5 0 0,0-2 363,3 24-408,-4-11 0,1 1 45,6 7-270,0-13 0,0-1 0,0 2-179,0 9 269,0-29 0,0-6 0,0-7-630,0-8 2435,0-25-1715,0 0 90,19-40 0,-14 18-511,28-16 511,-30 13 180,25 4-180,-24 5 450,21 0 0,-16 18-270,8 1-90,-6 31-90,-3-12 0,-2 37-180,-1-2-90,0 11-450,-1-13 1,0-1-1,4 8 720,2-9 0,2-1 0,7 0 0,11 7 0</inkml:trace>
+  <inkml:trace contextRef="#ctx0" brushRef="#br0" timeOffset="50496">21560 5865 8462,'-55'-5'450,"10"0"-270,5 5-180,8 18 0,1-14 0,2 30 180,2-10-180,-2-3 90,15 17-90,-1-25 0,15 16 65,0-10-425,26 0 360,12-9-180,13-1 236,3-9-56,0-22 0,-14 17-90,6-38 90,-30 26 74,3-19-164,-17 10 90,7 1-90,-9 1 0,-19 2 45,-7 1-315,1 1-359,-19 10-1,16 1 720,-14 9 0,17 0 0,11 0 0</inkml:trace>
+  <inkml:trace contextRef="#ctx0" brushRef="#br0" timeOffset="50874">21882 5848 9871,'-41'17'450,"1"3"-360,8 17-90,12-9 0,8 0-90,4-9 90,6 2-180,-5-2 0,7-3-359,18 4 449,7-9-180,22 0 180,-6-9-90,1 0 90,-12-18 0,-4 11 90,-2-27 0,-4 9 0,-1-8 540,-9-13-90,0 17-1,-10-7-179,0 11 180,0 6-450,0 0 0,0 5 0,-15 5 0,-1 2 90,-10 27-180,12 3-450,-1 26 0,13-13-179,-5-1-630,7-5 179,0-10 1170,0 3 0,17-16 0,6-4 0</inkml:trace>
+  <inkml:trace contextRef="#ctx0" brushRef="#br0" timeOffset="51059">22323 5141 9871,'-43'-2'450,"-2"23"-450,11-16-90,0 41-771,9-25 501,0 23-540,2-6-179,3 2 1079,2 21 0,5-15 0,2 16 0</inkml:trace>
+  <inkml:trace contextRef="#ctx0" brushRef="#br0" timeOffset="51430">22917 5988 9422,'-25'-20'719,"-7"15"1,29-48-450,-9 31 89,12-45-269,0 27-90,-1 4 0,2 0-1908,15-11 2088,-13-14 0,13 16 90,-16 2-180,0 0 177,0-11-267,0 16 111,0-9-111,0 30 90,0 1-180,0 34 90,0 16-90,0 15-315,0-9 0,0 1 543,0 16-1038,7-5 1,2 1-127,-6 9 576,6-20 1,-2-1-451,-7 14 900,11 0 0,-8-3 0,8 0 0</inkml:trace>
+  <inkml:trace contextRef="#ctx0" brushRef="#br0" timeOffset="51574">22777 6318 10591,'-10'3'180,"27"-1"-720,-10-19-179,49 12-91,-28-31-2535,32 19 1906,-9-16 1439,4 6 0,5 0 0,-1 0 0</inkml:trace>
+  <inkml:trace contextRef="#ctx0" brushRef="#br0" timeOffset="51857">24235 5570 11131,'-24'-7'269,"18"2"-269,-45 2 90,30 2 90,-25 0 0,11 1-180,1 0 0,0 17 0,3-13-90,4 29 90,-3-11-270,16 10-359,0 7-810,37-10 719,15 1-225,10-18 1,4-8 674,-13-8 0,-1-3-28,15 7 0,-3-5 0,-18-14 0,-4-4 1,31-8-1</inkml:trace>
+  <inkml:trace contextRef="#ctx0" brushRef="#br0" timeOffset="52524">24570 5018 10591,'-19'-31'270,"14"4"180,-14 9-91,19 8-269,-11 5 180,8 25 0,-8 21-180,11 13-616,0-6 0,0 1 526,0-15 0,0 0 0,0 12 0,0 3 0,-1 1 0,2-1 45,6-12 0,0 1-45,-6 22 0,2-2-45,12-26 0,1-2-360,-9 15 1,-2-2 44,13 0-211,-1 2 481,-15-23 90,12-6-180,-12-6-360,7-3 540,-3-4 1081,6-25-1081,-1 16 180,8-49 0,-6 35-180,4-16 0,-6 7 452,-2 25-362,-3-24 90,1 26-90,0-8 0,1 10-90,0 0 90,6 19-90,-3 1-90,3 2 180,-1 13-90,0-30-360,3 30 0,9-22 0,-3 5-359,20-8 539,-15-10 180,20-22-90,-19 16 180,4-36 180,-6 15 89,-11-9 181,6-2-360,-15 24 989,2-10-1079,-6 22-90,1 9-90,1 15 180,1-2-270,5 29 0,-2-42-359,3 41 269,-2-43 0,1 26-270,4-28-539,8 18 539,-2-20 91,16 6 449,-13-24-90,7 12 90,-10-32 90,-2 20 179,-3-19 271,-3 10 180,-3-1-181,-1 3 271,-3 2-810,-1-1-180,-2 8-809,-1 17-810,-1 9 1799,0 20 0,0-3 0,0 2 0</inkml:trace>
+  <inkml:trace contextRef="#ctx0" brushRef="#br0" timeOffset="53157">25483 5745 7443,'20'8'0,"9"-1"0,-25-1 0,43-3 0,-29 0-90,33-23 0,-31 15-270,6-30 270,-15 13 0,0-9 90,-8 0 90,-3 7 90,0 1 450,-20-10-361,-5 10-89,-22-9-90,22 18 360,-18 1 0,21 9-540,-13 3 180,16 22 90,3-16-90,15 34-90,-4-13 90,5 19 0,19-8-630,7 6 270,12-20-909,2 5 729,-7-12-179,2-4-1,0-1 519,1-5 0,-1-2 1,0-2-1</inkml:trace>
+  <inkml:trace contextRef="#ctx0" brushRef="#br0" timeOffset="53524">25977 5632 9512,'0'5'1529,"0"5"-1529,0 23-270,17-4 270,-2 0 90,17-14-90,-18 3 0,9-17-90,-15 6 90,9-7 0,-5 0 0,-2-16 0,1 12 0,-3-29-90,1 17 180,0-16 629,0-5-449,-2 9 90,1-12-450,-5 26 450,1-8-450,-2 20 180,0-5-90,0 25 0,4 7 0,-2 12-360,7 15-180,-2-16-680,3 9 320,-2-13 1,0-5 89,-1-2-1259,4 2 2069,-5-9 0,0-3 0,-4-10 0</inkml:trace>
+  <inkml:trace contextRef="#ctx0" brushRef="#br0" timeOffset="53774">25643 5154 10051,'-11'-7'0,"2"1"90,5 2 450,2-2-360,2 4 90,22-3-270,3 4 0,28-1-90,-13 2-90,5 0-90,-14 0-180,0 13-989,11-10 809,-12 26-989,15-12 1619,-22 2 0,5 8 0,-12-9 0</inkml:trace>
+  <inkml:trace contextRef="#ctx0" brushRef="#br0" timeOffset="53925">26478 5054 9781,'19'-6'90,"-2"5"-90,-4-6-180,1 7 1,-3 0-1441,9 0 1620,-11 15 0,4 1 0,-12 13 0</inkml:trace>
+  <inkml:trace contextRef="#ctx0" brushRef="#br0" timeOffset="56980">18713 8175 10591,'0'-5'899,"0"1"-809,0 1-90,0 0 0,13-3 0,-10-11 0,27-1 0,-5-27 0,9 10-1696,-10 1 0,-1 0 1696,6-10 0,9-10-131,-16 19 220,-3 4-178,-6 4 178,-1-3-89,-6 10 0,-2-3 0,-4 15 3327,0 1-3327,0 28-90,-15 38 0,11 0-1090,-11 0 1,-1 1 729,8-26 1,2 0-631,-4 26 1,1-1 1079,3-24 0,2-2 0,3 8 0,2-1 0,-1 12 0</inkml:trace>
+  <inkml:trace contextRef="#ctx0" brushRef="#br0" timeOffset="57374">19545 7743 7353,'19'-10'1079,"-14"0"-899,34 2 630,-6-1-91,3 5-539,10 0-90,-33 21 90,11 11-90,-22 12-45,5-4 0,-4 1 135,-28 19-504,24-17 1,-4 1 278,-29 4 0,-4-2 0,25-10 0,0 1-360,-19 18 0,-1-3 46,-2 0-541,17 15 91,1-37-156,17 0 965,18-18 0,-13-5 0,12-3 0</inkml:trace>
+  <inkml:trace contextRef="#ctx0" brushRef="#br0" timeOffset="57775">20133 7659 8702,'0'-4'720,"18"2"-630,1 1 0,19 1 179,-6 12-269,-4-9 0,-12 21 0,-8-7 90,-8 7-180,0 1-179,-22 6 179,17-6-180,-30 16 360,32-19-90,-11 15-90,14-19 180,27 6-180,-20-10 180,45 0-180,-31 1 180,35 6 90,-23-5 719,7 12-449,-12-13 0,-14 14-450,0-11 89,-14 8-89,0-7 0,-27 3 0,4 2-135,-10-5 1,-3-1-406,-9 10-540,6-6 1,-1 0-180,-4-1 1259,-8 6 0,23-16 0,4-1 0</inkml:trace>
+  <inkml:trace contextRef="#ctx0" brushRef="#br0" timeOffset="58326">21058 7595 10141,'0'-4'990,"0"1"-631,0 20-269,0 7-90,-17 12-90,12 19 90,-33-20 0,20 27-90,-6-28-526,11 9 256,2-19 241,8-2-151,-8-4 0,11-2-90,0-1 0,0-2-809,24-2 1096,8-5-737,33-3 450,-11-17-982,4 10 1073,-16-29 269,-3 28-9,-4-32 459,-6 32 0,-5-30 179,-8 31 181,-6-25 0,-6 18-91,-20-9-269,-2 11 879,-16 4-1149,1 23-180,15 4 0,-9 25-90,14-10-450,-8 22-89,10-22-410,5 13 409,6-16 91,0-2-181,0-2 720,24 5 0,4-13 0,24 3 0</inkml:trace>
+  <inkml:trace contextRef="#ctx0" brushRef="#br0" timeOffset="58561">21587 7894 10231,'-17'-6'180,"12"-4"-270,-12 5 360,17-2 180,-10 4-360,7 16-90,-7 8 0,10 9 0,16 17 90,-12-15-180,13 24 90,-7-23-180,-7 7-90,7-14-180,-10-4-269,0-3 89,0-2-90,0-4-89,-17-2 809,-3-3 0,-1-4 0,6-2 0</inkml:trace>
+  <inkml:trace contextRef="#ctx0" brushRef="#br0" timeOffset="58690">21543 7660 8342,'57'-28'0,"0"2"-90,2 5-573,-1 3 213,-20 10 0,1 2-1423,16-1 1873,12 2 0,-29 5 0,-4 0 0</inkml:trace>
+  <inkml:trace contextRef="#ctx0" brushRef="#br0" timeOffset="59124">22800 8210 8432,'40'0'0,"2"0"90,-2 0-2451,8 0 2001,9 0-90,6 0 180,-28-7 0,1 1-225,0 4 1,0 0 494,2-3 0,-1-3 0,1 2 0,-1-2 0,1-1 0,-1 0 0</inkml:trace>
+  <inkml:trace contextRef="#ctx0" brushRef="#br0" timeOffset="59557">23183 7818 8882,'24'9'540,"-5"0"-360,24-2 269,8 6-359,-6-1 0,-5 1 0,-1 2-2061,10 6 2061,-19-7 0,1 3-90,18 25 760,-16-7-760,-12-1 0,-4 2 90,-6 11-985,-1 18 715,-10-14-449,-24 1-451,17 5 279,-21-29 0,-4 0-368,1 30 1169,-1-29 0,-3-1 0,8 0 0,1 0 0,-1 0 0,-1 0 0</inkml:trace>
+  <inkml:trace contextRef="#ctx0" brushRef="#br0" timeOffset="61174">25683 7776 8342,'0'-13'1979,"-17"5"-1709,0-1-270,-4 7 90,-21-4-180,22 5 90,-41 17 0,27 8 0,5 0 0,0 2 90,-1 17-135,7-5 0,3 1 45,6 0-180,3-5 0,8-3 0,23-7-90,13 0 91,11-17 179,6-3-363,-8-4 183,3-21 270,3 15-135,-15-23 0,0-5 45,13 7 90,-11-11 0,-4-2 359,-3 1 271,1-21-450,-19 30-180,-6-2 0,-2 17 0,-2 5-90,0 42 0,0-12-180,0 39-270,0-22-989,0 20 719,0-13-315,6-8 1,5-2 1034,16 3 0,8 6 0,3-19 0</inkml:trace>
+  <inkml:trace contextRef="#ctx0" brushRef="#br0" timeOffset="61692">26808 7733 9242,'-46'-14'1079,"7"3"-1079,0 11 0,-7 0 0,7 0-90,-21 17 0,27 8 0,-4 10-180,19 17-89,9-16-541,4 23 181,22-25 719,20 11 0,9-26 0,12 0 0</inkml:trace>
+  <inkml:trace contextRef="#ctx0" brushRef="#br0" timeOffset="62040">27208 7747 8072,'0'-5'360,"-17"-1"-360,12 2 360,-27 1-90,17 1-180,-14 1 90,9 21-180,-3 5 0,13 12 0,-2-2-90,7-9 90,3 0 90,1 0-90,1-2-180,0-2 180,17-5 90,-13 2-180,33-10-270,-16 0 180,19-9-90,-20-16-90,9 13 181,-26-33-631,21 6 540,-14-10-629,2-14 899,-4 20 0,-8-7 0,0 13 0</inkml:trace>
+  <inkml:trace contextRef="#ctx0" brushRef="#br0" timeOffset="62593">27197 7357 9062,'-14'17'1349,"2"7"-1079,2 13-90,1 5-90,1-7 0,1 5-585,1 1 585,0 2-90,0 2 0,3 3-365,-3 1 365,4 3 0,-1 1-90,1-1 135,0-17 0,0 0-45,0 17-135,0-15 0,-1-3-45,-1-1 319,2-1-319,-1-19-1709,2-6 1440,0-19 507,0-14-58,23-12 0,-10 4 0,3 0 0,25-13 0,-20 15 0,-1-1 45,3 2 0,1 3 617,12-13-392,-8 13 0,1 3 0,2 9 90,14-1-270,-22 17 89,2 0 451,-4 18-540,-6 7 270,5 22-270,-10-7-90,0 9 90,-6-19-180,-2 7-90,-1-15-90,-18-1-270,13-4-899,-34 3 540,9-8 899,-22-1 0,8-9 0,2-2 0</inkml:trace>
+  <inkml:trace contextRef="#ctx0" brushRef="#br0" timeOffset="63074">28160 7655 9242,'-46'-9'449,"-4"2"-359,11 7 90,0 0-90,12 25 0,3-19-90,6 31 0,5 6 0,-2-14 45,5 14 0,3 1-135,7-10 90,21 15 0,-15-28 0,35 4 0,-13-19 90,13-1-180,10-25 180,-18 15-135,-7-24 0,-3-6 135,2 7-713,-9-6 0,-3-1 533,0-10 90,-6-3-146,-2 13 1,-1 0 504,-3-19 271,2 3 0,0 1-630,-3 4-45,0 9 0,0 4 315,0 15-270,0 20 90,0 27-270,12 14-270,-12-5 0,2 1-359,20 15-1035,-14-3 1,-3 1 854,8 10 404,-1-20 0,0-1 748,0 13 1,12-4 0,-5-2 0</inkml:trace>
+  <inkml:trace contextRef="#ctx0" brushRef="#br0" timeOffset="63408">28703 7803 10681,'9'0'630,"-2"0"-271,5 0-179,-1 0-90,15 0 0,-7 0-90,9 0 90,2 0 0,-6-17 0,14 1-180,-18-4 0,7-20 0,-16 24-90,-2-47 180,-6 34 0,-25-22 0,-7 33-90,-23 0 180,9 14-180,15 19 180,-4 16-90,17 9-90,4-5 0,1 0-539,0 14-451,19-6 1,3 1-1825,-7 8 2094,19-17 1,5-2 809,-1 9 0,1-22 0,2-2 0,19 18 0</inkml:trace>
+  <inkml:trace contextRef="#ctx0" brushRef="#br0" timeOffset="63528">29715 7993 11490,'-25'-13'-2518,"19"-9"1079,-43 11-287,29-12 1726,-22 3 0,8-3 0,0 1 0</inkml:trace>
+  <inkml:trace contextRef="#ctx0" brushRef="#br0" timeOffset="74096">8660 6241 7982,'0'17'720,"0"-3"-720,0-2 90,13 1 0,-9 4 0,9 4 0,1 6-90,-10 7 90,23 7-360,-14 8 360,4-6 0,2 2-300,-5-9 1,-1 4 209,3 8 0,2 6 0,-1-4-584,0 0 1,0 1 583,-3-6 0,2 5 0,1 1 0,-3-4-791,5 13 1,-1-1 790,-1-5 0,1 3 0,-1-3 45,1 7 0,0-2-45,1 3 0,1 0 0,-6-20 0,0 0 0,1 2 0,1 2 0,3 2 0,-1 1 0,1-3 30,1 3 0,-1-3 0,3 5-30,0-4 0,2 4 0,1 2 0,1-2 0,-3-5 0,4 4 0,-1-5 0,2 2-422,-2-2 0,3 2 0,-1 0 0,0-4 362,0-1 0,0-4 0,-1 1-90,2-1 0,0 0 1,0 0 59,-1-1 0,1-1 0,1 2-424,10 13 0,3 3 0,-2-3 394,-10-12 0,-2-2 1,3 4-61,3 6 0,4 6 0,-1-1 0,-3-5-32,-7-7 0,-2-4 1,1 3 153,3 7 0,3 4 0,-1 1 0,-3-6 58,5 11 0,-2-3 0,-6-8 0,2 1 0,-3-2 0,0 0 0,-1 0 0</inkml:trace>
+  <inkml:trace contextRef="#ctx0" brushRef="#br0" timeOffset="79877">11935 9966 9062,'0'-32'809,"0"5"-539,0 2 0,0 4 0,0 5-270,0 3 719,0 4-719,0 25 0,0 3 90,0 25-90,0-6 0,0 2 0,0-6 0,0 2-510,0 16 0,0 0 555,0-10 0,0 0-45,0-1 0,0 3 0,0 16 0,0 0-45,1-16 0,-2 0 45,-3 0 0,-2 5 0,1-6 0,4-8 0,-2-1-45,-9 8 0,-1-2-341,2 19 386,-2-20-810,-2 7 540,8-31 180,-5-2 90,3-11-450,-2-56 450,6 19-45,0-20 1,1-5-144,3 27 1,1-1 187,-1-9 0,-1-5 0,4 3 43,5 0 0,3 0-73,-3-6 0,0-6 0,1 4-1007,1 5 0,3 1 992,9-14 0,2-1 45,-5 6 0,2 5-56,3 13 0,3 1 101,7-16 0,-2 5 315,5 4-225,-9 19 0,-1 4-45,-1 8 279,3 3-369,-17 10 751,-3 25-661,-5-5-90,-2 44 0,-22-20 410,7-2 1,-2 1-681,-25 9 0,20-17 1,0-1-1194,-11 10 653,0-3-711,4-7 892,2-3 587,12-7 1,-6-4-1,7-3 1</inkml:trace>
+  <inkml:trace contextRef="#ctx0" brushRef="#br0" timeOffset="80278">12710 9936 8792,'-63'20'1079,"12"-15"-809,3 32-852,11-22 582,-1 15 89,3-4-178,1 1 178,6-2-89,2 3 98,6 5-98,2-7-180,9 12 0,3-19 98,6 3-548,23-7 450,1-9 90,26 1 0,-13-28 90,1 16 0,-12-41 0,9 11 90,-10-11 475,3-1 155,-7 4-270,-12 13-90,7-4-360,-15 14 182,4 8-92,-5 18-90,0 32-360,0 3-495,0-1 1,0 0-45,0 5-865,0 15 668,0-22 1096,22-3 0,-16-3 0,16-3 0</inkml:trace>
+  <inkml:trace contextRef="#ctx0" brushRef="#br0" timeOffset="80557">13360 9950 9422,'0'-9'180,"0"1"-180,0 3 89,-19 1-89,-2 3 0,-2 18 0,-6-12 0,25 30 0,-19-8 0,21 20 0,-7-6 0,9 9 90,-4-21-90,3 8-90,-9-7-89,4-8-451,-13 8 0,5-16 91,-6 3-1,5-11-270,-2 1 810,3-5 0,1-1 0,3-1 0</inkml:trace>
+  <inkml:trace contextRef="#ctx0" brushRef="#br0" timeOffset="80873">13712 9844 9602,'-29'17'89,"-8"0"-89,20 3 0,0 5 0,-9-8-89,24 15 178,-10-7-89,12 1 0,0 0 0,15-4 0,-11 14 0,25-15 90,-26 6 0,11-11 0,-14-2-90,0-1 90,0 3-90,0-3 90,-16 6-270,12-7-359,-34 5-181,8-8 90,-11 1-1079,-11-5 1709,26-3 0,0 0 0,17-2 0</inkml:trace>
+  <inkml:trace contextRef="#ctx0" brushRef="#br0" timeOffset="81110">13897 9920 9062,'0'-5'360,"0"1"-360,0 19 0,0 5 0,13 0-360,-10 19-90,11-21-90,-3 21-89,-8-10 89,17 1 540,-8 9 0,6-11 0,1 7 0</inkml:trace>
+  <inkml:trace contextRef="#ctx0" brushRef="#br0" timeOffset="81326">14387 9839 9691,'-21'48'90,"16"-5"-90,-32-1-465,34-5 465,-28-1-269,13 18-271,0-15-270,-1-2 1,3-1 179,11-4 630,-27 14 0,26-34 0,-10-2 0</inkml:trace>
+  <inkml:trace contextRef="#ctx0" brushRef="#br0" timeOffset="81508">14213 9857 7713,'11'-7'1079,"-8"-2"-539,22 8-270,-10-2-270,8 3 0,-2 17 0,-4-13 0,0 28 179,1-28-448,-1 32-1,0-19-1169,6 32 629,-5-17 810,14 21 0,-12-22 0,7 7 0</inkml:trace>
+  <inkml:trace contextRef="#ctx0" brushRef="#br0" timeOffset="81706">14917 9935 9242,'-23'15'270,"-13"-11"-180,20 27-90,-15-27 0,4 34-90,-7-6-270,8 10-180,7-12 0,1-1-269,2 5-91,0 9 900,9-15 0,6-3 0,-1-1 0</inkml:trace>
+  <inkml:trace contextRef="#ctx0" brushRef="#br0" timeOffset="82029">15210 10048 9062,'-24'-6'360,"17"1"89,-33 2-359,17 2 90,-9 1-180,0 15-90,-2 3 90,12 0-90,-7 11 90,14-10-359,7 15 179,2-9 90,6-2-180,21-8 90,-16-1 90,36 0-90,-14-1 180,11-6-90,8-2 0,-20-4 0,6-19-90,-22-3 0,-1-19-269,-35 1-451,-2 4 900,-24 8 0,10 12 0,2 7 0</inkml:trace>
+  <inkml:trace contextRef="#ctx0" brushRef="#br0" timeOffset="82357">15402 10080 7982,'0'27'270,"0"3"-270,0-8 0,0 2 0,0-3 90,0 1-90,0 1-90,0 1 90,0 9 0,0-8 0,0 6 90,0-15-90,0-2 0,0-4 90,0-2-180,9-5 90,-6-21 0,21-16 0,-14-12-1373,13-7 1373,-9 9-180,0-5-658,-1 0 298,-1 1-180,0 4 720,-2 3 0,2 3 0,0 2 0</inkml:trace>
+  <inkml:trace contextRef="#ctx0" brushRef="#br0" timeOffset="82774">15903 9857 8162,'-42'0'720,"1"0"-720,-5 20 0,15-15-90,1 36 90,20-22 0,-8 21 0,15 6 90,-7-9-270,10 24 90,15-26-90,5 14 180,0-25 0,15 4 0,-11-19-180,10-1 90,8-24 90,-18 12 0,9-51 0,-18 27 90,-7-12 0,-3-3-326,0-8 415,-5 17 1,0-1 180,0-16 270,0 2 0,0 0-91,-19-7-629,15 17-281,-27-6 461,28 29 0,-9 23-90,12 26-180,0 14-764,7-5 0,3 2-740,6 17 1684,1-2 0,-1 0 0,-7-22 0,-2-1 0,0 13 0,-1 0 0</inkml:trace>
+  <inkml:trace contextRef="#ctx0" brushRef="#br0" timeOffset="83210">16370 10329 9242,'52'0'180,"-5"0"-540,-7 0 0,1 0-1148,18 0 1508,-2 0 0,1 0 0,-21 0 0,0 0 0,12 0 0,1 0 0</inkml:trace>
+  <inkml:trace contextRef="#ctx0" brushRef="#br0" timeOffset="83674">17512 9345 9512,'-15'16'269,"4"14"-89,2 14-1867,1 13 1687,1-3 0,1-9 0,0 2 45,2-10 0,0 1-45,-2 28 0,1 0 45,2-27 0,1-1-90,0 11 0,0-2 135,1 12-180,1-4-90,-1-9-147,1 5 57,0-19 328,0 3-418,0-24-360,13-2 271,0-23 449,19-14 0,-7-9 0,8-10 0,-13 18 0,0-1 90,12-15 179,-5 9 1,0 1 828,1 0-468,15-3-360,-21 20 49,2 9-139,-7 2-180,-5 24 0,6 10 90,-9 10-360,3 25-180,-6-21-360,2 4 1,3 1 89,3-2 720,-2-9 0,2-4 0,10-8 0,3-3 0</inkml:trace>
+  <inkml:trace contextRef="#ctx0" brushRef="#br0" timeOffset="84045">18443 9974 8882,'-27'-5'1169,"-3"2"-989,-30 3-90,3 16 0,12 8-991,5 10 901,26 1 0,-10-7 128,20-2-38,-16 14-180,18-10-180,-5 15 90,27-21-90,4 8 180,0-18 504,19-2-414,-13-9-90,10-3 90,8-20 0,-25-9 0,9-26 90,-22 10 404,-2 8 1,-3 0-315,-4 2 0,3-24-270,-4 40 90,0-1-90,0 34-270,0 8-89,0 16-631,0 16 450,0-19-636,18 12 546,-14-17 720,32-4 0,-21-5 0,17-2 0</inkml:trace>
+  <inkml:trace contextRef="#ctx0" brushRef="#br0" timeOffset="84339">19030 9883 9242,'-21'-15'360,"16"2"-271,-34 3 1,34 1 0,-35 6-90,13 0 90,-17 22-90,6 7 90,18 10-270,9 0 360,11-7-180,0 3 0,0 1-90,21 18 180,-15-15-135,12-6 0,-1 0 225,-13 0-90,26 12-90,-27-24 0,13 1 0,-16-12 0,0 0-360,0-3-539,-19 0 539,14-2-899,-49 0 359,33-1 900,-29-1 0,25-20 0,-1-5 0</inkml:trace>
+  <inkml:trace contextRef="#ctx0" brushRef="#br0" timeOffset="84757">19187 9525 8342,'4'-3'2159,"0"14"-2249,-4 12 180,0 9-90,0 8 0,0-2 90,0 25-90,13-12-252,-11-17 1,0-1 161,11 12 90,-13-1 90,0-4-180,10-1 0,-7-5-90,7-2-540,-5 1 450,-4-9 270,7 1 0,-5-17-90,4-1 1,0-7 592,2 0-503,4-21 0,3 16 90,6-38-90,1 25 450,14-30-361,-7 21 361,14-11-90,-23 26-90,3-1 180,-13 13-181,0 0-269,-1 0 0,0 19 0,-3-15-179,1 52-361,-4-30-270,0 31-359,-3-19 90,0-2-91,0 0 1170,1-3 0,2-3 0,1-3 0</inkml:trace>
+  <inkml:trace contextRef="#ctx0" brushRef="#br0" timeOffset="84892">20097 10230 11221,'6'0'-585,"-3"12"0,0-9 1,-2 9-1</inkml:trace>
+  <inkml:trace contextRef="#ctx0" brushRef="#br0" timeOffset="85711">20747 9124 8162,'-37'14'180,"2"-10"90,9 29-609,-4-14 519,-3 22 0,0 1-969,-1 10 834,18-23 0,0 4-45,-5 20 0,2 3 0,5-13 0,2 3 0,3 6 0,0 5 0,3-3-90,-1-5 0,7 1-248,9-2 1,6 6 0,2 0 0,-1-6 22,1 3 0,4-1 315,4-8 0,6 6 0,2-3 0,-3-7 0,4-5 0,-1-4 0,13 8 0,0 0 0</inkml:trace>
+  <inkml:trace contextRef="#ctx0" brushRef="#br0" timeOffset="86006">22120 9002 9422,'47'-6'719,"2"2"-449,-1 2-704,-2 2 614,0 0 180,-2 16-1,0-12-179,-3 35 0,8 1-180,-17 13 0,-15-7 0,-4 3-614,-8-15 1,-2 1 523,1 16 0,-5 0-180,-12-9 0,-3 0-225,4 4 1,-2 0-514,-13 2 1,-2 1 377,3 1 1,-1 0-1210,-2 2 0,-3 0 1839,-2 0 0,-3 0 0,-1 0 0,-1 1 0,-2-1 0,0 0 0</inkml:trace>
+  <inkml:trace contextRef="#ctx0" brushRef="#br0" timeOffset="87507">15580 12256 8792,'-4'11'630,"1"-2"-630,2-22 90,1-10-90,17-14-90,-13-2 90,13 6 0,-1-3 180,-13 1-91,23 3 181,-24-6-360,16 14 630,-16-2-540,10 38-90,-8 14-180,4 34-449,-2-5-495,0 6 225,-1-12-1,0-2 990,1-1 0,2-3 0,0-2 0</inkml:trace>
+  <inkml:trace contextRef="#ctx0" brushRef="#br0" timeOffset="87823">16225 11831 7803,'2'-4'359,"0"1"-89,-1 0 90,6 2-270,-3 1 450,9 0-271,-6 0 91,7 12-90,-7 4-90,3 22-90,-7-6 0,0 9-90,-3 15 0,-18-10-45,9-5 0,-1 1-135,-12 7-270,7-10 1,4-1-181,8 1 180,-9 7-989,12-14 1439,0-12 0,0-1 0,0-12 0</inkml:trace>
+  <inkml:trace contextRef="#ctx0" brushRef="#br0" timeOffset="88240">16790 11790 8702,'18'14'360,"11"-1"-360,-25 21 90,12-11-180,-16 5 90,0-5-90,0 0-180,0 4 0,0-2-90,-17 0 91,12-1 89,-12-2 90,3 2 90,10-6 0,-11 5 0,15-12 90,16 3 0,-12-6 89,29 3 1,-29 0 180,30 7-180,-13-3 90,12 13 0,-14-9-270,-1 6 180,-16 3-270,6-6-90,-25 15-180,12-15-989,-31 13 449,8-17 900,3 2 0,-15-11 0,17-1 0</inkml:trace>
+  <inkml:trace contextRef="#ctx0" brushRef="#br0" timeOffset="88539">17378 11831 8792,'6'-1'2159,"-2"0"-2249,-3 19 90,0 2 90,-1 11-90,-13-2-90,9-4 90,-9 2-90,13 1 90,0-1 180,0 0-360,0-3 180,0 1-180,0-4-90,17-1-270,5 1 91,0-8-631,27-1 541,-28-9-1,29-2 0,-19-15-89,0 10 629,0-25 0,0 25 0,-1-10 0</inkml:trace>
+  <inkml:trace contextRef="#ctx0" brushRef="#br0" timeOffset="88739">17777 11999 8612,'-15'-4'1799,"4"13"-1709,-11 11-180,9 13 180,5-2-90,2-1-180,1-5-180,-2 14 1,3-7-271,0 9-180,3-2 361,0-11-541,1 13 181,0-22 809,17 2 0,-13-14 0,13-2 0</inkml:trace>
+  <inkml:trace contextRef="#ctx0" brushRef="#br0" timeOffset="89073">18138 11952 10771,'0'31'0,"-12"-14"0,10 17 0,-10-17 0,12 18 0,0-9 0,0 0 0,0 0-90,21 0 90,-15-2 90,31 8-90,-18-10 0,14 10 90,-15-17-90,-6 3 90,-3-7-90,-7-5-1260,7 0 1,-29-4 540,-1-1-811,-25-14 1530,15-3 0,-2-1 0,9 4 0</inkml:trace>
+  <inkml:trace contextRef="#ctx0" brushRef="#br0" timeOffset="89206">18135 11875 9152,'36'-21'539,"4"2"-449,21-2-180,-12 6-2266,14 0 2266,-18 7-450,-3 4 449,0 1-1978,9 3 2069,-15 0 0,6 0 0,-17 0 0</inkml:trace>
+  <inkml:trace contextRef="#ctx0" brushRef="#br0" timeOffset="89495">19460 12328 10771,'-16'7'180,"4"-1"0,12-2-450,24-2 180,12-1-630,-1 0 1,2-2-271,25-14-179,-15 14 0,-1-2 1037,12-24 1,-21 25 0,0 1 0,14-11-1</inkml:trace>
+  <inkml:trace contextRef="#ctx0" brushRef="#br0" timeOffset="89756">19797 12106 9422,'-10'-4'449,"0"0"-179,9 1 0,-2 1 0,3-2 0,22-2-180,11 1-90,10 0 90,22 1 90,-25 3-180,24 0 89,-30 15 1,11 7-90,-27 21-90,-1-4 1,-13 8-541,-26-7-540,4-6 1,-3 0 584,-3-7 1,-3 0 451,-4 9 0,1 1 0,5-10 0,1-2 0,-2 1 1,1 0-1</inkml:trace>
+  <inkml:trace contextRef="#ctx0" brushRef="#br0" timeOffset="91643">21815 11576 11490,'0'-22'-90,"0"-2"1,13 6-1,-10-4 90,9 5 0,-12-2 90,10-1-180,-8 1 90,12-6 0,-9 8 0,1-1-180,-3 10 0,-3 2-90,0 20-180,0 8-269,0 13 89,0 3 90,0-7-179,0 4-1,0-1-179,0 0 899,0-2 0,0-4 0,0-2 0</inkml:trace>
+  <inkml:trace contextRef="#ctx0" brushRef="#br0" timeOffset="91972">22178 11241 7533,'1'-9'-90,"1"2"180,-2 2 90,1 3-90,3 0-90,-1 2 0,5 14 0,-2 3 0,1 1 0,-1 15 0,-1-17 0,0 40 0,-2-26 0,-2 26 89,-1-31-178,0 10 89,0-16 89,0 0-178,0-6 89,0-5 0,0 1 89,-12 1-89,9-1-89,-9 6-91,3-3-540,-5 9-89,-5-6 809,0 4 0,3-5 0,0-1 0</inkml:trace>
+  <inkml:trace contextRef="#ctx0" brushRef="#br0" timeOffset="92323">22497 11232 8072,'-14'12'0,"-5"4"0,17 10 0,-5-4 0,7-2 0,0 2 0,18-6 90,-14 12-180,31-13 90,-20 7 0,5-10 0,-9 1 0,0-5 90,-9-2-90,9 0 90,-11-2-90,0 0 0,0 1-90,0 0-899,0 3 89,0-1 900,-14 2 0,11-3 0,-10 0 0</inkml:trace>
+  <inkml:trace contextRef="#ctx0" brushRef="#br0" timeOffset="92856">22863 11414 8612,'0'-5'810,"0"0"-91,-14 0-629,10 1-90,-11 0-90,2 1 90,-4 2 0,-8 0-90,3 20 90,12 2 0,0 21-90,9-3 90,13-2 90,-8-9-180,28-4 90,-7-16 90,10-1-180,0-7 90,-8 0 0,-1 0 0,9-20 0,-9-5-90,9-24-90,-20 8-179,1-12-1,-12 21 90,-1-9-180,-3 18 1,0 0-1,-19 6-1079,15-3 1529,-32 10 0,32 0 0,-13 8 0</inkml:trace>
+  <inkml:trace contextRef="#ctx0" brushRef="#br0" timeOffset="93190">23312 11306 9062,'-41'0'809,"-3"0"-809,10 0-90,0 0 180,14 13-180,4-10 90,15 24 0,-4-11 0,28 12 90,10-13-180,14 2 45,-10-15 0,0-2-44,14 7 133,-4-16 1,1-3-134,7 7 44,-14-12 0,-1-4-350,-2-4 125,1 3-629,-27-19 539,-5 21-360,-26-11-89,-20 6 809,-10 16 0,-17 2 0,10 7 0</inkml:trace>
+  <inkml:trace contextRef="#ctx0" brushRef="#br0" timeOffset="94490">22425 11107 7533,'-4'-1'1079,"0"14"-1079,4 2 90,0 15-90,0 0 0,0-1 90,0-3 0,0-7-90,0-6 0,0-5 0,0 10 0,0-1 0,0 10 90,0-4 360,0-4-2699,0-19 1709,0-7 180,0-9 360,0 3 0,0 6 0,0 1 0</inkml:trace>
+  <inkml:trace contextRef="#ctx0" brushRef="#br0" timeOffset="95406">22440 11158 9152,'0'27'809,"0"4"-809,16-3 0,-12 2 0,13-5 90,-17 1-90,0 2 0,9 0-90,-7 11 180,7-9-180,-9 19 180,0-28 0,0 8-1079,0-23 899,0-37 90,0 12-180,13-39 180,-10 33 0,22-4-90,-22 8 180,20 12-90,-11-4 0,8 12 90,0-4 90,-5 5-90,5 18-90,-8 0 0,0 2 0,-4 9-270,-2-25-180,-1 27-989,-1-14 360,0 9 1079,-1-6 0,0-6 0,1-1 0</inkml:trace>
+  <inkml:trace contextRef="#ctx0" brushRef="#br0" timeOffset="96506">22643 12401 7623,'12'-9'1349,"-2"-1"-1079,-10 1 90,0 1 359,4-1-89,-2 1-91,2 0-269,-4 0 0,0 2-180,0 0-180,0 0-90,-18 3 0,14 13-90,-30-7 91,30 22-1,-21-22-90,23 23 0,-6-8-180,8 14 360,0-8 0,0-4-90,18-13 91,-14 3-1,33-9 90,-9 4 0,9-5 0,12-18 179,-21-4-89,10-20 180,-24 10 180,7 10 0,-19-3-360,5 12-360,-7-10 90,0 33-360,0 14 1,0 17-181,0 0-809,19 7 180,1-12 1141,14 10 1,-5-19 0,-4-3-1</inkml:trace>
+  <inkml:trace contextRef="#ctx0" brushRef="#br0" timeOffset="96961">23697 12033 10321,'0'-5'270,"0"0"-180,0 20-180,0 6 180,0 14-90,0 28 0,0-25-135,-1-3 0,2 0-45,8-3-539,-6 13 449,6-24 90,-9 3-90,0-15-1169,0-2 1349,8-3-90,7-25 180,6-10 0,0 2 0,1-2 0,9-18-602,-8 23 0,0 1 872,11-5 0,-1 2-308,-3 14 218,-1-6 45,-5 18 45,-2-8 270,4 10-180,-10 20 179,8 6-359,-14 12-90,-1-1 180,-6 5-270,-3-10 0,-22 22 0,17-25-180,-37 12-270,15-21-629,-21 4 359,9-15-179,2-1 1203,7-7 0,11-1 0,-4 0 1</inkml:trace>
+  <inkml:trace contextRef="#ctx0" brushRef="#br0" timeOffset="97206">24737 12070 9062,'-27'15'1619,"20"8"-1349,-45-21-90,30 17-270,-21-11 90,10 8 0,4-3-90,0 1 90,15 0-90,-12 3-180,22-1 0,-10 2-899,14 9 539,0-5-809,17 13 180,17-18 1021,10 3 1,11-13-1,-9-1 1</inkml:trace>
+  <inkml:trace contextRef="#ctx0" brushRef="#br0" timeOffset="97706">25107 12077 8522,'-14'15'810,"-7"-11"-630,13 24-1,-15-13-89,9 8-90,-11 8-90,12-11 180,-4 8-180,9-8 180,3 3-180,2-2 1,2 9-91,1-9-180,19 8 180,9-19 0,26 1 90,-8-10-931,3-1 931,-13-23 90,0 17 0,-3-40-90,7 14 90,-12-13-209,-10 14 1,-3 0 208,-5-9 0,-4-4 0,-2-1 90,-4-3 0,-8 2 0,0 0 89,4 4 46,-3 8 0,-1 1-225,-6 0-180,11-12 270,-10 27 900,13 1-990,0 38 90,0-2-90,0 29 90,0-10 406,0 10-496,0 2 0,-1-11 0,2-1-179,9 21 221,-9-22 1,1 0-1303,8 29 541,-10-21-900,8 20 1619,-6-34 0,14 2 0,-7-13 0</inkml:trace>
+  <inkml:trace contextRef="#ctx0" brushRef="#br0" timeOffset="98009">25648 12324 9781,'16'0'720,"12"0"-810,-7 0-180,15-6 0,5-5 90,8-7 90,4-1 1,0-1-1028,-2-8 1072,-17 12 0,-2 1 45,4-7 226,-6 2-226,-4-9 90,-13 9 0,-2-3 449,-11 6-89,-23 8-360,-5 0 0,-25 24-90,11-11-90,14 32 180,-1-20 621,24 18-711,-20-6-270,23 0-899,-6 13 179,8-11-179,25 9 1169,-19-16 0,53-3 0,-17-1 0</inkml:trace>
+  <inkml:trace contextRef="#ctx0" brushRef="#br0" timeOffset="98141">26747 12277 10861,'3'13'-30,"0"-10"0,-3 10 0</inkml:trace>
+  <inkml:trace contextRef="#ctx0" brushRef="#br0" timeOffset="99689">21708 13682 10051,'0'-26'0,"14"3"0,-10 1 0,21 0 0,-22-2 0,25-4 0,-16-1 0,16-1 0,-9 2 0,-1 0 90,2-6-90,-7 8 0,2-2 0,-11 13 180,1 1-270,-3 5 180,0 1 0,-2 22-180,0 11-270,0 34-179,0-6-361,0-13 1,0 0-1,0 10 626,0 13 0,0-24 0,0-2 1</inkml:trace>
+  <inkml:trace contextRef="#ctx0" brushRef="#br0" timeOffset="100139">22288 13155 7892,'35'0'450,"-9"0"-450,-1 0 0,-10 0 270,2 0 0,-6 10-180,1-7-180,-9 17 90,-19 2-90,12 2-540,-29 16 450,14-19 90,-12 15 90,13-20 0,7 6 0,11-10 0,0 1 0,0-1 0,18 2 0,-14 0 90,32 1 90,-13 12 90,0-5 540,12 20-540,-21-15-1,4 18-269,-7-19 90,-11 8-90,0-12 0,-23-1 0,18 0-180,-24-6 1,-4-1-271,8 5-225,-10-3 1,-2-3-226,3-1 900,-8 1 0,19-10 0,2-1 0</inkml:trace>
+  <inkml:trace contextRef="#ctx0" brushRef="#br0" timeOffset="100935">23033 13262 8972,'0'-6'630,"-17"2"-541,-7 3 91,-14 43-180,-4-19 0,24 12 0,4 1 0,-7-5 0,2 21 0,17-24 0,-4 6 0,6-13 90,0-4-90,22-2 0,4-4-90,26-5 90,-13-3-90,2-21 0,-13 13-179,0-34 89,-5 22 90,-2-21 90,-10 9-90,4-1-180,-13-1-360,6-9 271,-8 12-541,0-12 900,-18 23 0,13-1 0,-13 10 0</inkml:trace>
+  <inkml:trace contextRef="#ctx0" brushRef="#br0" timeOffset="101273">23633 13225 9422,'-14'-6'719,"11"20"-809,-11 9 180,14 11-90,0-2-90,0-5 180,0-1-90,0-2 0,0-1-90,19 4 90,1-9-90,23 3 90,-13-15 0,14-1 0,-19-5-90,7-21 0,-14 16-179,-4-35 89,-7 23-180,-3-29-90,-4 16-719,-20-20 539,14 22 630,-36-16 0,10 24 0,-23-7 0</inkml:trace>
+  <inkml:trace contextRef="#ctx0" brushRef="#br0" timeOffset="101923">22712 13493 9062,'0'-9'719,"0"-6"-719,0-12-359,10 5-811,-7 2-269,7 8 1439,-10 2 0,0 5 0,0 3 0</inkml:trace>
+  <inkml:trace contextRef="#ctx0" brushRef="#br0" timeOffset="102153">22810 13815 8432,'0'0'0</inkml:trace>
+  <inkml:trace contextRef="#ctx0" brushRef="#br0" timeOffset="102756">23828 13610 8882,'-2'6'1709,"1"-2"-1709,0-2-270,0-18 0,0-3 0,1-13 91,0 2 179,0 2-270,0-1 180,15-4 0,-11 0 0,12-3 0,-16-2 90,0 2-90,0-2 180,0 2-90,0-13 0,0 12 180,-14-16-90,10 28 90,-22-4-180,23 17 90,-9 1 179,12 5 631,-8 3-720,6 17-90,-12-11 180,13 33-1,-12 1-179,9 12-90,-6 9 0,7-24 0,0 0 90,-1 19-270,1-9 1,1 0-451,1 6-360,0-10 1,0 0-825,1 2 734,0 10 1080,0-21 0,0-3 0,0-2 0</inkml:trace>
+  <inkml:trace contextRef="#ctx0" brushRef="#br0" timeOffset="103573">23428 13592 8162,'27'-21'315,"-1"0"0,18-15-225,6-1-985,-9 6 895,4-4 90,-1 0-90,-1-1 0,-4 0 90,-2 2 539,7-15-269,-15 13 450,11-17-451,-25 26-89,2-2 165,-12 15-435,-1 3 268,-4 4-268,0 2 0,0 25 0,0 7 0,-17 17 0,13 1-90,-13-5 552,4-1-2081,10 22 540,-9-16-46,11-8 1,2 0 928,-1 4 1,0 10 0,0-18-1</inkml:trace>
+  <inkml:trace contextRef="#ctx0" brushRef="#br0" timeOffset="103843">24343 13715 8882,'-8'0'0,"1"0"0</inkml:trace>
+  <inkml:trace contextRef="#ctx0" brushRef="#br0" timeOffset="105029">24330 13437 10411,'17'-8'-2159,"-4"0"2159,-6-1 0,2 3 0,7 6 0</inkml:trace>
+  <inkml:trace contextRef="#ctx0" brushRef="#br0" timeOffset="105613">24900 13585 8972,'6'-15'809,"0"11"-719,1-29 0,3 17 90,0-18-90,2 4-90,5-17 0,-4 11 90,6-28 90,-10 27 269,-3 0 1,0 1-180,-2 2-90,-1-25-180,-3 39-180,0-3 360,0 14-90,0 23-90,0 6 0,0 22 90,-11-4-90,8-8 0,-8-4 0,11-9 0,0 0 0,0 3 0,-6 10 0,4-5 0,-9 19 0,10-16 0,-6 8 0,6-11 0,-2-1 0,2 0-90,0-1-90,1-2-269,0 0-1081,0 3 721,0-6-1080,0 4 1889,0-10 0,0 0 0,0-5 0</inkml:trace>
+  <inkml:trace contextRef="#ctx0" brushRef="#br0" timeOffset="106206">24595 13241 9242,'0'36'539,"0"7"-539,0-9 0,0 4 0,0-12 0,0 9 0,0-9 90,0 5 0,18-7-180,-14-9 180,32 3-180,-15-13 90,9-1-90,-5-21-179,7-23 179,-14 0 0,-2 3 0,-3 0 0,-7-3-135,-2 4 0,-2 1-45,-2-4-809,0-21 359,-16 33 720,12-6 0,-13 19 0,17 2 0</inkml:trace>
+  <inkml:trace contextRef="#ctx0" brushRef="#br0" timeOffset="107211">22790 14747 7533,'14'-17'719,"-2"3"-359,-6 2 0,-1 9 449,-3-19-269,-1 9-270,-1-8 90,0 3-180,0 4-180,-16 0 90,13 5-180,-29-2 0,9 7 90,-8 1 0,-1 26 0,7-18 0,1 39 0,0-25-90,3 19 90,-2 4 0,9-10 0,3 19-90,8-25-180,3 7 180,23-12-90,6-10 0,29-2 270,-9-9-135,-16-7 0,-2-5 135,7-15-45,-9 5 0,-3-3-45,2-13 90,-5 2 450,-7 6-360,-11 15-180,4-13 90,-6 19 0,-3 10-180,0 31-180,0 6-405,9-1 1,2 0-316,7 4-583,5 14 674,7-20 899,-16-2 0,16-5 0,-6-3 0</inkml:trace>
+  <inkml:trace contextRef="#ctx0" brushRef="#br0" timeOffset="107655">23425 14512 8342,'0'-4'2069,"0"16"-1889,0 11-90,0 9 0,0 6 0,13-5-90,-10 21 0,9-11 0,-11-7 0,-2 1 0,1 3-135,0-2 0,0-2-45,0-5-180,0 16-359,0-35-451,0-1 1080,0-26 0,-10 12 0,7-35 90,-7 4 0,10-10 0,8 11 0,3 1 90,12-6 180,-2 9 0,0 1-90,1 2 180,16-2-180,-15 20 90,9 3-1,2 5-179,-18 16 0,8 5 0,-15 0-90,0 29 0,-7-27-270,-2 29-89,-24-22-361,18 2-90,-38-2-719,24 9 1529,-3-13 0,7 4 0,16-14 0</inkml:trace>
+  <inkml:trace contextRef="#ctx0" brushRef="#br0" timeOffset="107891">24275 14718 10951,'-44'-2'1079,"-5"14"-1079,13-9 0,-4 26 0,13-15 0,-7 30-90,11-14-90,3 14-899,9 4 449,9-11-899,18 22 630,-11-28 899,22-8 0,5-4 0,-8-1 0,33 2 0</inkml:trace>
+  <inkml:trace contextRef="#ctx0" brushRef="#br0" timeOffset="109260">24822 15081 8432,'-8'9'810,"3"-2"809,0 0-1169,26-25-361,2-6 91,4-14-90,13-2-529,-24 9 619,8 0-14,3-12 104,-13 14 89,5-22-359,-9 30 0,-10-9-179,0 22 179,0 0-90,0 5 180,0 20-180,0 15 0,0 12 409,0 9-678,0-7 44,0-10 0,0 1-225,0 22 0,0-11 1,0 1-1,0 6 45,0-11 1,0-1 134,0 4 135,-8-7 0,0-1 225,4-3 0,-33 15 90,9-37 540,-23-2-450,9-10 237,-8-23-58,24 15 181,-3-33-450,14 12-90,8-10-90,20-16 90,-9 18-495,28 3 1,7 1-719,-2-8 448,18 5 1,5 1 466,-26 13 0,-1 2 0,14-7 0,1 2 1,-13 8-1,0 0 0</inkml:trace>
+  <inkml:trace contextRef="#ctx0" brushRef="#br0" timeOffset="109709">25763 14762 9422,'-17'-4'1169,"13"1"-719,-30 0-360,12 2 90,-9 0-180,2 1 0,4 19-90,7-15 0,3 28-180,3-11-90,11 13 180,-4-4 180,5-4-270,21-8 0,6-2 270,25-7 90,-11-1-180,-1-8 90,-2-19 90,-13 14-180,7-30 180,-22 14 360,-1-17-180,-9 3-360,-16 5 360,13 11-180,-26 8-90,25 29 0,-9 11 90,13 14-90,0 2 0,0-10 0,0 2 0,0 0 0,17 13 0,-13-13 0,28 20-90,-28-30 90,11 6-450,-15-19-359,0-3-2430,0-4 3239,-15-19 0,11 10 0,-11-14 0</inkml:trace>
+  <inkml:trace contextRef="#ctx0" brushRef="#br0" timeOffset="110213">26388 14332 8792,'2'8'2429,"0"-3"-2250,0 0-89,0-1 0,0 4 0,-1 4 90,1 4 0,-2 3-90,1 19-90,-1-6 0,0 25 0,0-21-90,0 9 90,-12 5-450,9-11 1,-9 6-91,12-21 540,0-13-90,0-2-180,0-2 270,21-3-90,1-18 180,24-6 180,-12 0 0,0-13 0,-12 28 539,-3-24-539,0 26-270,-2-9 0,-4 12 0,-1 0 0,-4 0-540,7 14-629,-5 5-2159,11 18 3328,-5-6 0,5 0 0,-3-8 0</inkml:trace>
+  <inkml:trace contextRef="#ctx0" brushRef="#br0" timeOffset="110345">27387 14792 13199,'8'0'-1439,"-2"0"-630,0 0 2069,-4-17 0,1 0 0,-3-15 0</inkml:trace>
+  <inkml:trace contextRef="#ctx0" brushRef="#br0" timeOffset="126371">24770 7047 8972,'0'39'809,"0"-3"-539,0 8-820,0 2 640,0 5 0,0 8-2027,0 6 1982,0-31 0,0 1-45,0 2 0,0 0 0,0 1 0,0 0 45,0 1 0,0 1-45,0-1 0,0 1-45,0 0 0,0-1 90,0 1 0,0 0-135,0-1 0,0 0 0,0-1 0,0-1-135,0-2 0,0 2-675,0 9 1,0-1-948,0 19 1847,0-25 0,0-2 0,0 2 0,0-4 0</inkml:trace>
+  <inkml:trace contextRef="#ctx0" brushRef="#br0" timeOffset="127272">24777 6928 8432,'32'-25'900,"-10"8"-721,13 4 1,3 1-90,11 0-1130,3 4 1,4 1 1129,-17 4 0,2 1-536,17-1 1,3 1 535,-11 1 0,0 1-135,7 0 0,0 0 90,3-1 0,5 2-45,-16 2 0,4 2 0,0 0 0,-1-1-30,3-2 0,-1-2 0,5 3-307,-1 2 1,5 3 0,4 0 0,-3 0 0,-5-3 336,9-2 0,-6-3 0,4 2-335,-15 2 1,3 3-1,1 0 1,-1-1-1,-3-1 365,16-3 0,-4-3 0,0 3-53,-13 3 1,0 2 0,0 0-1,0-2 23,-1-2 0,0-1 0,2 0 0,2 1-161,2 2 0,4 1 1,2 0-1,-2 0 0,-2 0 138,-1-2 1,-3 1 0,1-1-1,4 0-65,-2 1 1,4 0 0,3 1 0,0-1-1,-3 0 1,-6 0 87,13 1 0,-5-1 0,3 2 13,-8-2 1,5 2 0,1-1-1,-3 1 1,-6-1 16,0 0 0,-6-1 0,5 2-30,-2-1 0,7 2 0,2-1 0,-3 1 0,-7-1-45,15 2 0,-1 0 67,-11-2 1,6 1-1,0 1 1,-10-2 452,-3-1 1,-3 0-506,1 1 0,4-1 0,-6 0 75,-6-1 0,-3 0-45,10 1 0,-3 0 180,10 1-180,-5 0 0,-4 2 180,-4-2 180,-3 3-270,-3-1 180,5 8-90,-10-2 1294,9 16-1384,-20-8-90,7 22 180,-13-15-180,0 15 90,-4-12-90,-3 2 2082,0 3-2082,-2 20 0,0-10 45,0-5 0,0 1 2878,0 12-2923,-9-5 0,-2 0-242,6 13 242,-11-22 0,-2 1 0,7 0 0,2 0 0,-10 21 0,3-13 0,-1-1 0,0 6 0,3-14 0,-1-3 0,-4 4 0,8 6-214,-2-11 214,8-11 90,-10 8-180,8-19 254,-10 4-254,-1-12 922,-10 3-832,-7-7-180,-10 1-1218,-13 0 1398,23-3 0,-1 1-45,-5-1 0,-1 0 45,-3 0 0,-4 0-120,1 0 0,-5 1 0,1-1 30,-9 0 0,-4 0 0,12 1 0,-7-1 0,1 1 0,4-1 0,6 0 0,4 0 1,-4 0-781,-12 0 1,-6 0-1,0 1 1,5-1 749,6-1 0,4 0 0,-2 0 52,2 0 1,-2 0-1,-1 0 1,0 0-634,-4-1 0,-2 0 0,2 0 0,1 0 671,-3 1 0,2-1 0,-5-1-279,3-1 0,-5-1 0,-3-1 1,2 0-1,5 2 309,-5 1 0,5 0 0,-5-1-73,14-1 1,-5-2 0,-2 1 0,0-2 0,2 1-1,5 1 118,-2-1 0,6 1 0,-1-1 0,-5 1-30,-1-1 0,-5 0 0,-3 0 0,-1-1 0,4 1 0,4-1-15,0-1 0,6 0 0,-1 0 0,-7 0 0,2 0 0,-6 0 0,-5 0 0,-1 0 0,1 0 0,4 0 0,7 1 0,-2-1 0,7 1 0,0 0 0,-6-1 15,-3-1 0,-6-1 0,-3-1 0,1 0 0,5 1 0,8 1 15,0-1 0,7 1 0,0 0 110,-12-3 0,-2-1 0,6 1-140,4 1 0,4 0-45,4 0 0,-1 0-465,-6 0 0,2-1 510,16 4 0,1 0 0,-5-1 0,4 0 0,5 1 0,7 0 0</inkml:trace>
+  <inkml:trace contextRef="#ctx0" brushRef="#br0" timeOffset="129396">24572 7063 7173,'-4'-4'180,"0"-1"-90,1-1 0,-1 0 0,-1 0-90,0-1 0,-1 1 90,1 0 0,-3 0-1,2 0 1,-4 1-90,3-1 0,-4 0 90,3 0 0,-1 0-90,-1 0 90,0-1 0,-2 0 0,2-1-90,-9-5 90,3 2 0,-15-9-180,9 7 90,-7-5 90,5 5-90,0-2 0,-5-1 0,2 0 0,-4-2 0,0 2 0,-22-10 0,11 7 45,3 3 0,-2 1-775,-12-4 775,17 9 0,0 1-1326,-22-4 1371,-2 5-90,-5 1 0,30 5 0,0 0 0,0 1 0,0 1 0,-1 0 0,-3-1-45,-14 0 0,-1 2 90,14 6 0,-1 2-45,-4-3 0,-3-1 0,5 1 0,5 3 0,2 1 0,-11 5 0,-1 0-446,7-5 0,1 1 536,-18 17-90,11-9 0,3-1 0,-3 3-45,9-2 0,1 0 45,-3 4 0,8-4 0,1 1 0,-2 2 417,-8 7-597,10-2 90,9-7-359,-10 9 89,17-13 519,-4 4-159,10-11 0,0 1 0,4-7 0</inkml:trace>
+  <inkml:trace contextRef="#ctx0" brushRef="#br0" timeOffset="129922">22613 6570 7982,'-7'0'270,"-1"12"-360,-10 5 180,2 8 0,-24 16-90,12-11-1175,-12 11 1175,8-8 0,0 0 0,-2 1 45,10-8 0,-1-1-45,-12 13 0,7-6 0,0 1 370,-1 1-370,7-6 0,2 0 0,1-1 0,1 6 180,12-14-90,5-3 0,2-3-180,1 0-90,32-4-180,-5-2-270,15-4 1,4-2-1608,15 2 2237,-15-3 0,0 0 0,-10 0 0,-1 0 0,3 0 0,-1 0 0</inkml:trace>
+  <inkml:trace contextRef="#ctx0" brushRef="#br0" timeOffset="188453">22265 15421 7982,'-3'-5'270,"1"2"-180,2 0 180,0 1-180,0-3 0,24 0-90,-18-3 90,40 0-90,-25-2 90,20 1-250,-3-2 250,2 2-1,5 2-89,5 2 270,4 1-1743,2 4 1563,7-1-45,-29 1 0,1 0-90,3 0 0,1 0 90,4-1 0,1 2-45,4 6 0,3 1 0,4-5 0,2-2-1130,6 7 1,3 0 1159,-19-3 0,2 0 0,0-1-721,3-3 0,1 0 0,1 0 691,4 3 0,0 1 0,2 0 0,1-1 0,2-1 0,0 0-416,1-2 1,2-1 0,0 1 437,-16 1 1,1 1 0,1-1-1,-1 1-22,1-1 0,1 1 0,-1-1 0,1 0 0,0-1 0,0-1 0,0 0 0,0 1 0,0 1 0,0 0 0,1 1 0,3-1 0,2-1 0,4 0 0,2 0 0,-1-1 0,-4 1 0,0 0 0,-2-1 0,-1 1 0,6 0 15,-2 0 0,5 0 0,3 0 0,-1 0 0,-2 1 0,-7-1-38,-2-1 1,-6 1 0,-1 0-1,6-1 41,7 1 0,5 0 0,2 1 0,-2-1 0,-8 0-18,-1 0 0,-6 0 0,4 0 0,3 0 0,5 1 0,-1 0 0,-7 0-45,6 1 0,-5-1 45,-10 0 0,0 1 0,-4-1 149,-4 0 1,-4 0-150,-1 1 0,-2-1 0,24 1 1091,7 1-1001,-25-3 2099,9 1-4527,-31-1 3542,-27 0-1204,-19-1 0,-17-12 0,-1-2 0</inkml:trace>
+  <inkml:trace contextRef="#ctx0" brushRef="#br0" timeOffset="189262">15392 13005 7353,'30'5'539,"-1"2"-269,36-5-2197,0 2 2016,-25-3 1,2 0-1255,5-1 0,3 0 1210,5 0 0,2 0-45,5 1 0,2-2 30,-18-4 0,1-2 0,0 1-30,3 5 0,1 1 0,0-3 30,4-7 0,0-2 0,1 2-60,1 7 0,1 4 0,4-2-229,-10-3 1,3-2 0,3 0-1,-1 0 1,-3 1 280,1 1 1,-2 1-1,-1-1 1,4 1-316,-1 0 0,4 0 0,0 0 1,-1 0-1,-4 0 263,14-1 0,-4 1 0,0 0-191,-1 0 0,0 0 0,0 1 191,-4 1 0,-1 1 0,3-1-127,-5 0 1,2-2 0,0 1 0,-4 1 126,0 0 0,-3 1 0,3 1 20,4 2 0,4 1 0,-1 1 0,-7-2 219,7-2 0,-3 2-329,-2 7 0,4 2 0,-6-3 91,-11-7 0,-3 0 29,8 12 0,-3-1 0,16-10 932,-26 19-932,1-13 0,-28 8 0,-4-7 0</inkml:trace>
+  <inkml:trace contextRef="#ctx0" brushRef="#br0" timeOffset="190406">18897 11445 7803,'0'11'1529,"0"11"-1529,0 15 90,0 8-2293,0 2 2203,-11 9 90,8 6-90,-2-27 0,-1 0 45,0 2 0,2 0-45,3 1 0,0 2 45,-6 16 0,-1 1-45,4-15 0,1 2 30,-1 3 0,-1 5 0,0-6-75,0-4 0,0-1 15,0 3 0,1 4 0,1-5-105,0-5 0,0-1-45,-1 9 1,1 1-406,2-6 0,-1-1-224,1 19 809,1-13 0,0-2 0,0 3 0,0 10 0</inkml:trace>
+  <inkml:trace contextRef="#ctx0" brushRef="#br0" timeOffset="191553">18857 12991 8252,'-18'-5'360,"13"2"-270,-22 1-90,25 20 90,-18-13 0,18 38-90,-17-19 90,12 25-887,-10 0 887,5 8-669,-2 8 579,8-29 0,-1 1-433,0 3 1,0 0 432,-1 4 0,0 0-497,0 2 0,0 2 497,-1 1 0,1 1 45,-2 1 0,1 1-45,0 2 0,0 0-385,-2 1 0,1 0 340,1 1 0,-1 1 90,1 0 0,-1 0-45,2-1 0,0 3 30,3-4 0,-1 3 0,2-2-30,1-11 0,1-2 0,-1 3 0,0 9 0,-1 4 0,5-1 0,5 1 0,5 0 0,0-3 0,-3-12 0,0-2 0,4 3 45,6 7 0,5 5 0,3-2 0,-2-5-373,0-8 0,1-5 0,2 2 358,9 9 0,4 2 0,0-5 0,-5-13 0,0-5 0,2 0-30,1 0 0,2-1 0,3-1 22,4 0 1,5-1-1,2 0 1,-4-2-23,6 2 0,-2-3 0,3 1 22,-4-2 1,4 0-1,1-1 1,1-1-23,1-1 0,1-3 0,0 0 0,-3-1-30,4 2 0,-2-2 0,5 0 30,-6-3 0,6 1 0,2 0 0,-2-1 0,-6-1-366,4-1 1,-4-1 0,2 0 365,-3-1 0,2-1 0,1 0 0,-5-1-60,0-2 0,-4 0 0,0-1-60,0 0 0,0 0 0,-1 0 0,0-1 0,0 0 0,-1 0 0,-1 1 0,-1 0 0,0-3 30,-1-5 0,-1-2 0,-1 2-45,20 6 1,0-3-46,-10-13 0,0-5 0,-2 3 132,5 8 1,0-2-73,-2-8 0,2-6 0,-6 2 75,-11 5 0,-2-2 15,-1-3 0,1-3 0,-5 1-15,-7 1 0,-4 0 45,6-7 0,-4-4-135,-8 1 1,-5-1-140,3-19 274,-7 20 0,-3 1 0,-3-10 0,-2 2 0</inkml:trace>
+  <inkml:trace contextRef="#ctx0" brushRef="#br0" timeOffset="192036">21935 15134 7353,'-6'0'539,"3"13"-359,0 4 0,26 0 0,-17 15 0,54-5-180,-34 7 0,12-8 0,3-3-565,5 7 700,-15-10 0,0 0 44,14 9 1,-1 2 0,-14-8 0,0 1-90,10 13-45,-14-13 0,-2 2 135,7 31-180,-13-12 0,-9-3 0,-2 1 0,-4 9 0,-10-4 0,-6 1-1094,-20 8 914,13-19 0,-2-2-135,-3-9 0,0-3-494,-13 25-181,-2-1 990,2-2 0,3-3 0,1-1 0</inkml:trace>
+  <inkml:trace contextRef="#ctx0" brushRef="#br0" timeOffset="195770">8600 14862 8072,'-7'-5'990,"-1"1"-720,4-2-180,-2 2-90,2 0-90,-1 1 90,1 1 449,0 2-359,2 0 0,0 17-90,1 2 90,1 22 0,0 4-90,0-2 0,0 4-214,0-11 0,0 4 214,0 7 0,0 5 0,0-4-45,0-3 0,0 0 75,0 2 0,0 4 0,0-4-30,0-9 0,0 0 0,0 18 0,0-2 0,0 0 180,0 7-180,0-22-90,0-15-1169,0 1 1079,0-34 90,-15-21 0,13-5 0,0-4 45,-13 2 0,-1-3-614,12-5 0,6-4 0,-4 2 659,-10-1 0,-1-3 0,11-7 0,2-7 0,0 5-45,-4 4 0,-1 2 75,4 7 0,0-1 0,3 3-30,7-1 0,0 4-45,-8 1 0,3 3 37,14 2 0,5 2 8,-5-4 0,0 2 45,4 11 0,3 2-45,8-6 0,0 4 0,5 7 90,20 3 90,-28 13-90,2 20 0,-14-13 0,-6 34-90,-1-21 0,-6 34 0,-2-15-450,-1-3 0,-4 1-359,-17 10-447,14 13 1256,-29-16 0,30-3 0,-10 0 0</inkml:trace>
+  <inkml:trace contextRef="#ctx0" brushRef="#br0" timeOffset="196170">9377 14754 8702,'-42'20'270,"-1"2"-360,2 21 90,18-11-180,-11-2 90,31-5-90,-11-3 90,14 1-90,0-7 0,21-8 90,0-4 180,20-25 90,-6-4 180,-5-24-180,-5 4-180,-13 4-90,-6 12 90,-2 14 0,-2 21 90,5-3-180,-1 24 180,1-23-270,1 29-180,3-16-1079,10 31 1439,-3-16 0,8 9 0,-6-13 0</inkml:trace>
+  <inkml:trace contextRef="#ctx0" brushRef="#br0" timeOffset="196454">9818 14690 9062,'-25'-13'90,"-9"4"-90,31 1 0,-27 5 0,14 1 0,-2 20 0,6 4 90,12 11-90,0-1-90,0-5 180,23 17-90,-17-11 0,12-4 0,4-1 0,-2 3 90,0 7 180,6-10-181,-23-10-89,7 4-89,-10-13-451,-17 4 0,-13-9-539,-25 4 449,8-7 630,-1 1 0,18-2 0,2 0 0</inkml:trace>
+  <inkml:trace contextRef="#ctx0" brushRef="#br0" timeOffset="196753">10055 14632 9242,'-43'20'-90,"17"11"0,-2-27 180,25 23 0,-9-13-180,12 11 90,0-1 90,0-6-180,20 5 90,2-10 0,17 4 90,-19-7 359,6 3-449,-23-8 0,7 3 90,-10-4-90,-26 4-90,20-1-1439,-57 8 450,40-3 1079,-28 2 0,24-3 0,3-1 0</inkml:trace>
+  <inkml:trace contextRef="#ctx0" brushRef="#br0" timeOffset="197019">10423 14729 9062,'-17'-1'-90,"3"20"90,28 2 90,-11 11-90,25 0-90,-24-6-360,26 4-90,-26-1-1079,35 16 1619,-25-13 0,15 11 0,-14-16 0</inkml:trace>
+  <inkml:trace contextRef="#ctx0" brushRef="#br0" timeOffset="197224">10898 14618 8702,'-42'20'360,"1"6"-360,19 13 0,-14 1 0,21-8 0,-26 16-180,18-12-1748,-5 8 1388,14-18 504,3-4-504,3-4 593,3-3 1,1-8-1,1-2 1</inkml:trace>
+  <inkml:trace contextRef="#ctx0" brushRef="#br0" timeOffset="197391">10670 14563 7713,'0'-12'0,"10"6"449,-7-1-449,13 7 0,-9-2 90,5 2-90,0 16 0,8 4 0,-3 0 90,19 32-180,-14-30-449,9 30-271,-7-22 810,0 1 0,3-3 0,-1 0 0</inkml:trace>
+  <inkml:trace contextRef="#ctx0" brushRef="#br0" timeOffset="197588">11427 14621 9332,'-24'-4'0,"3"1"0,-27 22 0,17-14 0,-6 34 0,11-22 0,-3 21-274,3-9-265,2 2-1,5-1-270,10 0 810,-2 10 0,10-11 0,-3 7 0</inkml:trace>
+  <inkml:trace contextRef="#ctx0" brushRef="#br0" timeOffset="197924">11678 14698 9512,'-20'-4'359,"-12"0"-449,11 4 180,-11 19-180,0 1 180,9 20-180,9-11 180,7 0-180,7-8 180,0 7-90,0-8 0,14 10 0,-10-16-90,30-2 0,-18-7 90,14-27 0,-16-6-89,-5-12-1,-9 2 0,0-4-90,-20 11-630,-3-18 91,-2 26-1,-6-4 720,28 11 0,-23 8 0,11 0 0</inkml:trace>
+  <inkml:trace contextRef="#ctx0" brushRef="#br0" timeOffset="198241">11842 14672 8162,'0'29'270,"0"5"-180,0-3-90,0 13 0,0-17 0,0 17 0,0-21 90,0 7 0,0-16 0,0-2-90,0-8 0,0-27 0,6-29-90,-5-6 45,2 10 0,0 1-405,-3-5 450,3 4 0,1 0 0,1 4 0,6-20 0</inkml:trace>
+  <inkml:trace contextRef="#ctx0" brushRef="#br0" timeOffset="198707">12250 14578 8792,'-33'0'180,"2"0"-270,7 0 180,0 19-90,5 5 90,7 12 0,4-4-90,7-6 90,0-3-90,1 1 0,0-3 90,16-2-90,-12-2 0,26-2 0,-9-5 0,17-4 0,-8-3 90,1-21-90,-4-12 0,-7-10 0,-6 6 0,-2-1 0,-3-14 0,-2 2 0,-1-2 180,-5-16 239,-4 21 1,-2-7 0,1 6-364,2 8 0,0 0-11,-4-28 0,-3 3-45,-7 14 90,12-8 270,-11 36-270,15 23-90,16 29 0,-12 14-1655,14-5 0,0 2 1655,-14 15-45,12-16 0,0 1-813,-13 19 363,10-30 1,-1 1-855,-9 30 333,8-31 0,2-1 1016,-2 31 0,10-2 0,-4 0 0</inkml:trace>
+  <inkml:trace contextRef="#ctx0" brushRef="#br0" timeOffset="198952">13090 14940 8792,'0'-14'0,"0"0"0,19 2-90,-14 0-360,36 2-1349,-9-4 1799,10 5 0,0 0 0,-13 5 0</inkml:trace>
+  <inkml:trace contextRef="#ctx0" brushRef="#br0" timeOffset="199385">13870 14356 7803,'-4'18'1169,"1"2"-1169,3 25 0,15-10 0,-11 4 90,11-8-90,-5 1 90,-7 1-90,7-2 90,2-1 90,-9-3 89,17-4 1,-18-3-90,18-4-180,-11-8 0,17-3 0,-9-28 0,8 18 0,-7-49-517,2 27-203,0-30 0,0 8-179,-4-3-181,-1-2 1080,-4 1 0,-4 2 0,-1 3 0</inkml:trace>
+  <inkml:trace contextRef="#ctx0" brushRef="#br0" timeOffset="199720">14382 14637 7173,'8'19'1079,"6"0"-899,-1-8 90,11-2-360,-9-9 180,15-17-90,-11 13-90,14-32 270,-16 8-180,5-33 180,-14 18 360,-1-17-450,-7 36-90,-22-10 0,1 20 0,-18 2 0,7 8 0,6 18 89,11 8-178,6 21 178,9-3-178,0 18-1,0-22-892,22 11 172,-17-17 0,34-3-232,-34-2 1042,37-6 0,-22-3 0,21-4 0</inkml:trace>
+  <inkml:trace contextRef="#ctx0" brushRef="#br0" timeOffset="200020">14833 14312 9152,'-17'-8'719,"12"23"-719,-13 7 180,38 14-90,-16 13-90,33-16-90,-19 24 90,3-25 0,3 18 0,-12-26 270,5 13-270,-4-24-90,-8 3 90,-1-33-450,-4-30 91,17-3-192,-15 15 1,1 1-80,28-13-89,-28 1-181,11 2 900,2 2 0,-12 6 0,11 1 0</inkml:trace>
+  <inkml:trace contextRef="#ctx0" brushRef="#br0" timeOffset="200269">15322 14409 9691,'0'28'0,"0"7"90,0-6-90,0 4-179,0-8-271,0 1-270,0-3-1349,10 8 2069,-7-10 0,14 3 0,-9-11 0</inkml:trace>
+  <inkml:trace contextRef="#ctx0" brushRef="#br0" timeOffset="200436">15265 13977 9332,'-7'-9'-2519,"6"3"2519,-6 24 0,7-14 0,0 17 0</inkml:trace>
+  <inkml:trace contextRef="#ctx0" brushRef="#br0" timeOffset="200774">15737 14772 7803,'11'0'269,"9"-17"1,-1-10 360,13-26-540,-9 5 135,-9 12 0,0 1-1857,0-9 1722,-2-16 424,-9 3-155,-2 13-134,1 10 0,-4 1-225,-17-1 374,14-13-464,-14 30 180,6-2 0,10 31-90,-10 18-90,5 33 90,6 0-146,-2-14 0,0 0-304,4 17 135,0-22 0,0-1-404,0 18-91,17-2 1,-13-1 809,4-19 0,1 0 0,5 20 0,-6-23 0,0 1 0</inkml:trace>
+  <inkml:trace contextRef="#ctx0" brushRef="#br0" timeOffset="200906">15813 14990 8522,'0'-39'-90,"0"1"0,0-4 90,0 1-315,12 9 1,4 0-226,15-15 540,-3 8 0,3 2 0,11-3 0,-3-10 0</inkml:trace>
+  <inkml:trace contextRef="#ctx0" brushRef="#br0" timeOffset="201085">16213 14349 7353,'6'13'0,"0"-9"0,2 25 0,-2-25 0,9 23 90,-4-10-90,5 5-90,-1 1-450,2-10 540,3 0 0,2-2 0,1 0 0</inkml:trace>
+  <inkml:trace contextRef="#ctx0" brushRef="#br0" timeOffset="201572">16558 14241 9871,'-21'-6'810,"4"0"-810,17 17 0,0 6 0,0 25 0,0-6 90,0 8-90,13 7 0,1-11 0,0-6 0,2-1 0,6 5 0,12 19 0,-11-28-549,8 5 459,-8-17 123,0-3-123,-1-5 90,7-4 90,-10-3-90,9-1-90,-16-17 727,-1 12-637,-7-27 59,-4 10-59,0-15 0,0 1 90,0 7-180,-17 13 90,13-3-90,-13 9 90,7-8 0,7 7-90,-7 4 90,5 4-90,4 14-1799,-3 1 0,4 12 1889,0-8 0,0-5 0,0-7 0</inkml:trace>
+  <inkml:trace contextRef="#ctx0" brushRef="#br0" timeOffset="202003">16570 14270 8432,'-8'-1'180,"3"0"270,2 21-180,10 11 0,2 5-181,-5 21 1,10-14 0,2 4-90,-8 5 0,1-2 45,6-16 0,2 1-440,-5 9 1,-2 5-1,1-5 350,3-9 0,0-3 90,-1 12 0,0 0-45,5 14 0,0-2-42,-1-3 42,-8-20 0,0-1 0,2 13 90,0 14-90,-9-32-90,-17 4-180,10-20-899,-27-3 0,-7-8-91,8-20 1216,-7 12 0,0-3 0,-3-30 0,0 6 0</inkml:trace>
+  <inkml:trace contextRef="#ctx0" brushRef="#br0" timeOffset="202386">16350 14119 9152,'0'-5'989,"-9"16"-899,-1 14-180,-6 10 90,3 8 180,2-5-180,3 1 0,0 22 0,5-17-45,10-9 0,2-1-405,-5 1-584,22-9 0,5-4-496,-2-2 1443,3-10 0,1-3 0,13-3 1,2-4-1</inkml:trace>
+  <inkml:trace contextRef="#ctx0" brushRef="#br0" timeOffset="202836">17132 13801 8162,'-21'15'990,"0"-11"-990,3 42 0,1-19 90,1 30-90,9-21 0,1 0 90,-1 24-135,3-10 0,2 1 45,2 7-630,11-13 0,6-2-449,21 1 692,-14-17 0,3-3 0,28 4 1,-13-3-1</inkml:trace>
+  <inkml:trace contextRef="#ctx0" brushRef="#br0" timeOffset="203052">17665 13840 9332,'21'-6'629,"-5"1"1,31 19-270,-19-10-91,-4 21 1,-1 4-180,1-1-749,-12 3 0,-1 2 659,2 14 0,-11 5-89,4 5-1081,-14-11 1,-6 0 179,-4-8 1,-4-1 721,-3 14 0,-3-1 0,-6-12 0,0-2 0,5 1 1,1 0-1</inkml:trace>
 </inkml:ink>
 </file>
 
@@ -6039,6 +6261,57 @@
           <a:chExt cx="0" cy="0"/>
         </a:xfrm>
       </p:grpSpPr>
+      <mc:AlternateContent xmlns:mc="http://schemas.openxmlformats.org/markup-compatibility/2006">
+        <mc:Choice xmlns:p14="http://schemas.microsoft.com/office/powerpoint/2010/main" Requires="p14">
+          <p:contentPart p14:bwMode="auto" r:id="rId2">
+            <p14:nvContentPartPr>
+              <p14:cNvPr id="2" name="Ink 1">
+                <a:extLst>
+                  <a:ext uri="{FF2B5EF4-FFF2-40B4-BE49-F238E27FC236}">
+                    <a16:creationId xmlns:a16="http://schemas.microsoft.com/office/drawing/2014/main" id="{B11C4734-912C-F945-9234-31C48FBB2DE5}"/>
+                  </a:ext>
+                </a:extLst>
+              </p14:cNvPr>
+              <p14:cNvContentPartPr/>
+              <p14:nvPr/>
+            </p14:nvContentPartPr>
+            <p14:xfrm>
+              <a:off x="726480" y="229680"/>
+              <a:ext cx="10164960" cy="5650560"/>
+            </p14:xfrm>
+          </p:contentPart>
+        </mc:Choice>
+        <mc:Fallback>
+          <p:pic>
+            <p:nvPicPr>
+              <p:cNvPr id="2" name="Ink 1">
+                <a:extLst>
+                  <a:ext uri="{FF2B5EF4-FFF2-40B4-BE49-F238E27FC236}">
+                    <a16:creationId xmlns:a16="http://schemas.microsoft.com/office/drawing/2014/main" id="{B11C4734-912C-F945-9234-31C48FBB2DE5}"/>
+                  </a:ext>
+                </a:extLst>
+              </p:cNvPr>
+              <p:cNvPicPr/>
+              <p:nvPr/>
+            </p:nvPicPr>
+            <p:blipFill>
+              <a:blip r:embed="rId3"/>
+              <a:stretch>
+                <a:fillRect/>
+              </a:stretch>
+            </p:blipFill>
+            <p:spPr>
+              <a:xfrm>
+                <a:off x="710280" y="213480"/>
+                <a:ext cx="10197360" cy="5682960"/>
+              </a:xfrm>
+              <a:prstGeom prst="rect">
+                <a:avLst/>
+              </a:prstGeom>
+            </p:spPr>
+          </p:pic>
+        </mc:Fallback>
+      </mc:AlternateContent>
     </p:spTree>
     <p:extLst>
       <p:ext uri="{BB962C8B-B14F-4D97-AF65-F5344CB8AC3E}">

</xml_diff>